<commit_message>
Updated Presentation and fixed Singlish
</commit_message>
<xml_diff>
--- a/Presentation Data/Presentation.pptx
+++ b/Presentation Data/Presentation.pptx
@@ -8,12 +8,16 @@
     <p:sldId id="256" r:id="rId2"/>
     <p:sldId id="259" r:id="rId3"/>
     <p:sldId id="263" r:id="rId4"/>
-    <p:sldId id="265" r:id="rId5"/>
-    <p:sldId id="264" r:id="rId6"/>
-    <p:sldId id="260" r:id="rId7"/>
-    <p:sldId id="258" r:id="rId8"/>
-    <p:sldId id="261" r:id="rId9"/>
-    <p:sldId id="262" r:id="rId10"/>
+    <p:sldId id="267" r:id="rId5"/>
+    <p:sldId id="265" r:id="rId6"/>
+    <p:sldId id="268" r:id="rId7"/>
+    <p:sldId id="264" r:id="rId8"/>
+    <p:sldId id="266" r:id="rId9"/>
+    <p:sldId id="269" r:id="rId10"/>
+    <p:sldId id="260" r:id="rId11"/>
+    <p:sldId id="258" r:id="rId12"/>
+    <p:sldId id="261" r:id="rId13"/>
+    <p:sldId id="262" r:id="rId14"/>
   </p:sldIdLst>
   <p:sldSz cx="12192000" cy="6858000"/>
   <p:notesSz cx="6858000" cy="9144000"/>
@@ -3185,7 +3189,7 @@
           <a:p>
             <a:fld id="{A500FAE4-36E0-4E83-B6C4-950FF4C558C8}" type="datetimeFigureOut">
               <a:rPr lang="en-US" smtClean="0"/>
-              <a:t>7/13/2018</a:t>
+              <a:t>7/14/2018</a:t>
             </a:fld>
             <a:endParaRPr lang="en-US"/>
           </a:p>
@@ -3509,7 +3513,7 @@
           <a:p>
             <a:fld id="{A500FAE4-36E0-4E83-B6C4-950FF4C558C8}" type="datetimeFigureOut">
               <a:rPr lang="en-US" smtClean="0"/>
-              <a:t>7/13/2018</a:t>
+              <a:t>7/14/2018</a:t>
             </a:fld>
             <a:endParaRPr lang="en-US"/>
           </a:p>
@@ -3757,7 +3761,7 @@
           <a:p>
             <a:fld id="{A500FAE4-36E0-4E83-B6C4-950FF4C558C8}" type="datetimeFigureOut">
               <a:rPr lang="en-US" smtClean="0"/>
-              <a:t>7/13/2018</a:t>
+              <a:t>7/14/2018</a:t>
             </a:fld>
             <a:endParaRPr lang="en-US"/>
           </a:p>
@@ -4096,7 +4100,7 @@
           <a:p>
             <a:fld id="{A500FAE4-36E0-4E83-B6C4-950FF4C558C8}" type="datetimeFigureOut">
               <a:rPr lang="en-US" smtClean="0"/>
-              <a:t>7/13/2018</a:t>
+              <a:t>7/14/2018</a:t>
             </a:fld>
             <a:endParaRPr lang="en-US"/>
           </a:p>
@@ -4443,7 +4447,7 @@
           <a:p>
             <a:fld id="{A500FAE4-36E0-4E83-B6C4-950FF4C558C8}" type="datetimeFigureOut">
               <a:rPr lang="en-US" smtClean="0"/>
-              <a:t>7/13/2018</a:t>
+              <a:t>7/14/2018</a:t>
             </a:fld>
             <a:endParaRPr lang="en-US"/>
           </a:p>
@@ -4817,7 +4821,7 @@
           <a:p>
             <a:fld id="{A500FAE4-36E0-4E83-B6C4-950FF4C558C8}" type="datetimeFigureOut">
               <a:rPr lang="en-US" smtClean="0"/>
-              <a:t>7/13/2018</a:t>
+              <a:t>7/14/2018</a:t>
             </a:fld>
             <a:endParaRPr lang="en-US"/>
           </a:p>
@@ -5287,7 +5291,7 @@
           <a:p>
             <a:fld id="{A500FAE4-36E0-4E83-B6C4-950FF4C558C8}" type="datetimeFigureOut">
               <a:rPr lang="en-US" smtClean="0"/>
-              <a:t>7/13/2018</a:t>
+              <a:t>7/14/2018</a:t>
             </a:fld>
             <a:endParaRPr lang="en-US"/>
           </a:p>
@@ -5492,7 +5496,7 @@
           <a:p>
             <a:fld id="{A500FAE4-36E0-4E83-B6C4-950FF4C558C8}" type="datetimeFigureOut">
               <a:rPr lang="en-US" smtClean="0"/>
-              <a:t>7/13/2018</a:t>
+              <a:t>7/14/2018</a:t>
             </a:fld>
             <a:endParaRPr lang="en-US"/>
           </a:p>
@@ -5703,7 +5707,7 @@
           <a:p>
             <a:fld id="{A500FAE4-36E0-4E83-B6C4-950FF4C558C8}" type="datetimeFigureOut">
               <a:rPr lang="en-US" smtClean="0"/>
-              <a:t>7/13/2018</a:t>
+              <a:t>7/14/2018</a:t>
             </a:fld>
             <a:endParaRPr lang="en-US"/>
           </a:p>
@@ -5935,7 +5939,7 @@
           <a:p>
             <a:fld id="{A500FAE4-36E0-4E83-B6C4-950FF4C558C8}" type="datetimeFigureOut">
               <a:rPr lang="en-US" smtClean="0"/>
-              <a:t>7/13/2018</a:t>
+              <a:t>7/14/2018</a:t>
             </a:fld>
             <a:endParaRPr lang="en-US"/>
           </a:p>
@@ -6183,7 +6187,7 @@
           <a:p>
             <a:fld id="{A500FAE4-36E0-4E83-B6C4-950FF4C558C8}" type="datetimeFigureOut">
               <a:rPr lang="en-US" smtClean="0"/>
-              <a:t>7/13/2018</a:t>
+              <a:t>7/14/2018</a:t>
             </a:fld>
             <a:endParaRPr lang="en-US"/>
           </a:p>
@@ -6481,7 +6485,7 @@
           <a:p>
             <a:fld id="{A500FAE4-36E0-4E83-B6C4-950FF4C558C8}" type="datetimeFigureOut">
               <a:rPr lang="en-US" smtClean="0"/>
-              <a:t>7/13/2018</a:t>
+              <a:t>7/14/2018</a:t>
             </a:fld>
             <a:endParaRPr lang="en-US"/>
           </a:p>
@@ -6875,7 +6879,7 @@
           <a:p>
             <a:fld id="{A500FAE4-36E0-4E83-B6C4-950FF4C558C8}" type="datetimeFigureOut">
               <a:rPr lang="en-US" smtClean="0"/>
-              <a:t>7/13/2018</a:t>
+              <a:t>7/14/2018</a:t>
             </a:fld>
             <a:endParaRPr lang="en-US"/>
           </a:p>
@@ -7024,7 +7028,7 @@
           <a:p>
             <a:fld id="{A500FAE4-36E0-4E83-B6C4-950FF4C558C8}" type="datetimeFigureOut">
               <a:rPr lang="en-US" smtClean="0"/>
-              <a:t>7/13/2018</a:t>
+              <a:t>7/14/2018</a:t>
             </a:fld>
             <a:endParaRPr lang="en-US"/>
           </a:p>
@@ -7150,7 +7154,7 @@
           <a:p>
             <a:fld id="{A500FAE4-36E0-4E83-B6C4-950FF4C558C8}" type="datetimeFigureOut">
               <a:rPr lang="en-US" smtClean="0"/>
-              <a:t>7/13/2018</a:t>
+              <a:t>7/14/2018</a:t>
             </a:fld>
             <a:endParaRPr lang="en-US"/>
           </a:p>
@@ -7405,7 +7409,7 @@
           <a:p>
             <a:fld id="{A500FAE4-36E0-4E83-B6C4-950FF4C558C8}" type="datetimeFigureOut">
               <a:rPr lang="en-US" smtClean="0"/>
-              <a:t>7/13/2018</a:t>
+              <a:t>7/14/2018</a:t>
             </a:fld>
             <a:endParaRPr lang="en-US"/>
           </a:p>
@@ -7720,7 +7724,7 @@
           <a:p>
             <a:fld id="{A500FAE4-36E0-4E83-B6C4-950FF4C558C8}" type="datetimeFigureOut">
               <a:rPr lang="en-US" smtClean="0"/>
-              <a:t>7/13/2018</a:t>
+              <a:t>7/14/2018</a:t>
             </a:fld>
             <a:endParaRPr lang="en-US"/>
           </a:p>
@@ -8071,7 +8075,7 @@
           <a:p>
             <a:fld id="{A500FAE4-36E0-4E83-B6C4-950FF4C558C8}" type="datetimeFigureOut">
               <a:rPr lang="en-US" smtClean="0"/>
-              <a:t>7/13/2018</a:t>
+              <a:t>7/14/2018</a:t>
             </a:fld>
             <a:endParaRPr lang="en-US"/>
           </a:p>
@@ -8674,6 +8678,1025 @@
     <p:extLst>
       <p:ext uri="{BB962C8B-B14F-4D97-AF65-F5344CB8AC3E}">
         <p14:creationId xmlns:p14="http://schemas.microsoft.com/office/powerpoint/2010/main" val="4288696436"/>
+      </p:ext>
+    </p:extLst>
+  </p:cSld>
+  <p:clrMapOvr>
+    <a:masterClrMapping/>
+  </p:clrMapOvr>
+</p:sld>
+</file>
+
+<file path=ppt/slides/slide10.xml><?xml version="1.0" encoding="utf-8"?>
+<p:sld xmlns:a="http://schemas.openxmlformats.org/drawingml/2006/main" xmlns:r="http://schemas.openxmlformats.org/officeDocument/2006/relationships" xmlns:p="http://schemas.openxmlformats.org/presentationml/2006/main">
+  <p:cSld>
+    <p:spTree>
+      <p:nvGrpSpPr>
+        <p:cNvPr id="1" name=""/>
+        <p:cNvGrpSpPr/>
+        <p:nvPr/>
+      </p:nvGrpSpPr>
+      <p:grpSpPr>
+        <a:xfrm>
+          <a:off x="0" y="0"/>
+          <a:ext cx="0" cy="0"/>
+          <a:chOff x="0" y="0"/>
+          <a:chExt cx="0" cy="0"/>
+        </a:xfrm>
+      </p:grpSpPr>
+      <p:sp>
+        <p:nvSpPr>
+          <p:cNvPr id="2" name="Title 1">
+            <a:extLst>
+              <a:ext uri="{FF2B5EF4-FFF2-40B4-BE49-F238E27FC236}">
+                <a16:creationId xmlns:a16="http://schemas.microsoft.com/office/drawing/2014/main" id="{9DBFA03A-DADA-4F99-9C0C-8BAB4ED41B58}"/>
+              </a:ext>
+            </a:extLst>
+          </p:cNvPr>
+          <p:cNvSpPr>
+            <a:spLocks noGrp="1"/>
+          </p:cNvSpPr>
+          <p:nvPr>
+            <p:ph type="title"/>
+          </p:nvPr>
+        </p:nvSpPr>
+        <p:spPr/>
+        <p:txBody>
+          <a:bodyPr/>
+          <a:lstStyle/>
+          <a:p>
+            <a:r>
+              <a:rPr lang="en-US" dirty="0"/>
+              <a:t>Relevance to Singapore</a:t>
+            </a:r>
+          </a:p>
+        </p:txBody>
+      </p:sp>
+      <p:pic>
+        <p:nvPicPr>
+          <p:cNvPr id="5" name="Picture 4">
+            <a:extLst>
+              <a:ext uri="{FF2B5EF4-FFF2-40B4-BE49-F238E27FC236}">
+                <a16:creationId xmlns:a16="http://schemas.microsoft.com/office/drawing/2014/main" id="{E0E162BD-9D85-46AA-8243-F3EF8448915D}"/>
+              </a:ext>
+            </a:extLst>
+          </p:cNvPr>
+          <p:cNvPicPr>
+            <a:picLocks noChangeAspect="1"/>
+          </p:cNvPicPr>
+          <p:nvPr/>
+        </p:nvPicPr>
+        <p:blipFill>
+          <a:blip r:embed="rId2">
+            <a:extLst>
+              <a:ext uri="{28A0092B-C50C-407E-A947-70E740481C1C}">
+                <a14:useLocalDpi xmlns:a14="http://schemas.microsoft.com/office/drawing/2010/main" val="0"/>
+              </a:ext>
+            </a:extLst>
+          </a:blip>
+          <a:stretch>
+            <a:fillRect/>
+          </a:stretch>
+        </p:blipFill>
+        <p:spPr>
+          <a:xfrm>
+            <a:off x="3809392" y="2475217"/>
+            <a:ext cx="4284021" cy="3607597"/>
+          </a:xfrm>
+          <a:prstGeom prst="rect">
+            <a:avLst/>
+          </a:prstGeom>
+        </p:spPr>
+      </p:pic>
+    </p:spTree>
+    <p:extLst>
+      <p:ext uri="{BB962C8B-B14F-4D97-AF65-F5344CB8AC3E}">
+        <p14:creationId xmlns:p14="http://schemas.microsoft.com/office/powerpoint/2010/main" val="890265409"/>
+      </p:ext>
+    </p:extLst>
+  </p:cSld>
+  <p:clrMapOvr>
+    <a:masterClrMapping/>
+  </p:clrMapOvr>
+</p:sld>
+</file>
+
+<file path=ppt/slides/slide11.xml><?xml version="1.0" encoding="utf-8"?>
+<p:sld xmlns:a="http://schemas.openxmlformats.org/drawingml/2006/main" xmlns:r="http://schemas.openxmlformats.org/officeDocument/2006/relationships" xmlns:p="http://schemas.openxmlformats.org/presentationml/2006/main">
+  <p:cSld>
+    <p:spTree>
+      <p:nvGrpSpPr>
+        <p:cNvPr id="1" name=""/>
+        <p:cNvGrpSpPr/>
+        <p:nvPr/>
+      </p:nvGrpSpPr>
+      <p:grpSpPr>
+        <a:xfrm>
+          <a:off x="0" y="0"/>
+          <a:ext cx="0" cy="0"/>
+          <a:chOff x="0" y="0"/>
+          <a:chExt cx="0" cy="0"/>
+        </a:xfrm>
+      </p:grpSpPr>
+      <p:pic>
+        <p:nvPicPr>
+          <p:cNvPr id="5" name="Picture 4">
+            <a:extLst>
+              <a:ext uri="{FF2B5EF4-FFF2-40B4-BE49-F238E27FC236}">
+                <a16:creationId xmlns:a16="http://schemas.microsoft.com/office/drawing/2014/main" id="{7B3A1FD9-D7DC-4C43-AB47-8A094B9D528E}"/>
+              </a:ext>
+            </a:extLst>
+          </p:cNvPr>
+          <p:cNvPicPr>
+            <a:picLocks noChangeAspect="1"/>
+          </p:cNvPicPr>
+          <p:nvPr/>
+        </p:nvPicPr>
+        <p:blipFill>
+          <a:blip r:embed="rId2"/>
+          <a:stretch>
+            <a:fillRect/>
+          </a:stretch>
+        </p:blipFill>
+        <p:spPr>
+          <a:xfrm>
+            <a:off x="6828209" y="2616739"/>
+            <a:ext cx="3905250" cy="3267075"/>
+          </a:xfrm>
+          <a:prstGeom prst="rect">
+            <a:avLst/>
+          </a:prstGeom>
+        </p:spPr>
+      </p:pic>
+      <p:sp>
+        <p:nvSpPr>
+          <p:cNvPr id="6" name="Title 1">
+            <a:extLst>
+              <a:ext uri="{FF2B5EF4-FFF2-40B4-BE49-F238E27FC236}">
+                <a16:creationId xmlns:a16="http://schemas.microsoft.com/office/drawing/2014/main" id="{D6023992-794B-48FA-9B10-86769973EB5E}"/>
+              </a:ext>
+            </a:extLst>
+          </p:cNvPr>
+          <p:cNvSpPr>
+            <a:spLocks noGrp="1"/>
+          </p:cNvSpPr>
+          <p:nvPr>
+            <p:ph type="title"/>
+          </p:nvPr>
+        </p:nvSpPr>
+        <p:spPr>
+          <a:xfrm>
+            <a:off x="1295402" y="982132"/>
+            <a:ext cx="9601196" cy="1303867"/>
+          </a:xfrm>
+        </p:spPr>
+        <p:txBody>
+          <a:bodyPr/>
+          <a:lstStyle/>
+          <a:p>
+            <a:r>
+              <a:rPr lang="en-US" dirty="0"/>
+              <a:t>Fake news migration</a:t>
+            </a:r>
+          </a:p>
+        </p:txBody>
+      </p:sp>
+      <p:sp>
+        <p:nvSpPr>
+          <p:cNvPr id="7" name="TextBox 6">
+            <a:extLst>
+              <a:ext uri="{FF2B5EF4-FFF2-40B4-BE49-F238E27FC236}">
+                <a16:creationId xmlns:a16="http://schemas.microsoft.com/office/drawing/2014/main" id="{D97996B0-82B3-4FD9-B1AC-4D3E4DE158A6}"/>
+              </a:ext>
+            </a:extLst>
+          </p:cNvPr>
+          <p:cNvSpPr txBox="1"/>
+          <p:nvPr/>
+        </p:nvSpPr>
+        <p:spPr>
+          <a:xfrm>
+            <a:off x="8005863" y="2363821"/>
+            <a:ext cx="1074140" cy="369332"/>
+          </a:xfrm>
+          <a:prstGeom prst="rect">
+            <a:avLst/>
+          </a:prstGeom>
+          <a:noFill/>
+        </p:spPr>
+        <p:txBody>
+          <a:bodyPr wrap="none" rtlCol="0">
+            <a:spAutoFit/>
+          </a:bodyPr>
+          <a:lstStyle/>
+          <a:p>
+            <a:r>
+              <a:rPr lang="en-US" dirty="0"/>
+              <a:t>Singapore</a:t>
+            </a:r>
+          </a:p>
+        </p:txBody>
+      </p:sp>
+      <p:sp>
+        <p:nvSpPr>
+          <p:cNvPr id="8" name="Content Placeholder 2">
+            <a:extLst>
+              <a:ext uri="{FF2B5EF4-FFF2-40B4-BE49-F238E27FC236}">
+                <a16:creationId xmlns:a16="http://schemas.microsoft.com/office/drawing/2014/main" id="{B7A7F021-5801-4CAF-8768-EA8F85CB98F1}"/>
+              </a:ext>
+            </a:extLst>
+          </p:cNvPr>
+          <p:cNvSpPr>
+            <a:spLocks noGrp="1"/>
+          </p:cNvSpPr>
+          <p:nvPr>
+            <p:ph idx="1"/>
+          </p:nvPr>
+        </p:nvSpPr>
+        <p:spPr>
+          <a:xfrm>
+            <a:off x="1295401" y="2556932"/>
+            <a:ext cx="5290225" cy="2715459"/>
+          </a:xfrm>
+        </p:spPr>
+        <p:txBody>
+          <a:bodyPr/>
+          <a:lstStyle/>
+          <a:p>
+            <a:pPr marL="0" indent="0">
+              <a:buNone/>
+            </a:pPr>
+            <a:r>
+              <a:rPr lang="en-US" dirty="0"/>
+              <a:t>“The use of social media for news has started to fall in a number of key markets — after years of continuous growth. At the same time, we continue to see a rise in the use of messaging apps for news as consumers look for more private (and less confrontational) spaces to communicate.”</a:t>
+            </a:r>
+          </a:p>
+        </p:txBody>
+      </p:sp>
+      <p:sp>
+        <p:nvSpPr>
+          <p:cNvPr id="9" name="TextBox 8">
+            <a:extLst>
+              <a:ext uri="{FF2B5EF4-FFF2-40B4-BE49-F238E27FC236}">
+                <a16:creationId xmlns:a16="http://schemas.microsoft.com/office/drawing/2014/main" id="{D2355833-4D77-4BF9-B640-28C6BDCA0B71}"/>
+              </a:ext>
+            </a:extLst>
+          </p:cNvPr>
+          <p:cNvSpPr txBox="1"/>
+          <p:nvPr/>
+        </p:nvSpPr>
+        <p:spPr>
+          <a:xfrm>
+            <a:off x="2557779" y="5229537"/>
+            <a:ext cx="2928238" cy="646331"/>
+          </a:xfrm>
+          <a:prstGeom prst="rect">
+            <a:avLst/>
+          </a:prstGeom>
+          <a:noFill/>
+        </p:spPr>
+        <p:txBody>
+          <a:bodyPr wrap="none" rtlCol="0">
+            <a:spAutoFit/>
+          </a:bodyPr>
+          <a:lstStyle/>
+          <a:p>
+            <a:r>
+              <a:rPr lang="en-US" dirty="0"/>
+              <a:t>2018 Digital News Reports</a:t>
+            </a:r>
+          </a:p>
+          <a:p>
+            <a:r>
+              <a:rPr lang="en-US" dirty="0"/>
+              <a:t>Published by Reuters Institute</a:t>
+            </a:r>
+          </a:p>
+        </p:txBody>
+      </p:sp>
+    </p:spTree>
+    <p:extLst>
+      <p:ext uri="{BB962C8B-B14F-4D97-AF65-F5344CB8AC3E}">
+        <p14:creationId xmlns:p14="http://schemas.microsoft.com/office/powerpoint/2010/main" val="2461371443"/>
+      </p:ext>
+    </p:extLst>
+  </p:cSld>
+  <p:clrMapOvr>
+    <a:masterClrMapping/>
+  </p:clrMapOvr>
+</p:sld>
+</file>
+
+<file path=ppt/slides/slide12.xml><?xml version="1.0" encoding="utf-8"?>
+<p:sld xmlns:a="http://schemas.openxmlformats.org/drawingml/2006/main" xmlns:r="http://schemas.openxmlformats.org/officeDocument/2006/relationships" xmlns:p="http://schemas.openxmlformats.org/presentationml/2006/main">
+  <p:cSld>
+    <p:spTree>
+      <p:nvGrpSpPr>
+        <p:cNvPr id="1" name=""/>
+        <p:cNvGrpSpPr/>
+        <p:nvPr/>
+      </p:nvGrpSpPr>
+      <p:grpSpPr>
+        <a:xfrm>
+          <a:off x="0" y="0"/>
+          <a:ext cx="0" cy="0"/>
+          <a:chOff x="0" y="0"/>
+          <a:chExt cx="0" cy="0"/>
+        </a:xfrm>
+      </p:grpSpPr>
+      <p:sp>
+        <p:nvSpPr>
+          <p:cNvPr id="2" name="Title 1">
+            <a:extLst>
+              <a:ext uri="{FF2B5EF4-FFF2-40B4-BE49-F238E27FC236}">
+                <a16:creationId xmlns:a16="http://schemas.microsoft.com/office/drawing/2014/main" id="{85C731FC-1ED2-4202-BF87-3E45FF6AEA74}"/>
+              </a:ext>
+            </a:extLst>
+          </p:cNvPr>
+          <p:cNvSpPr>
+            <a:spLocks noGrp="1"/>
+          </p:cNvSpPr>
+          <p:nvPr>
+            <p:ph type="title"/>
+          </p:nvPr>
+        </p:nvSpPr>
+        <p:spPr>
+          <a:xfrm>
+            <a:off x="1295402" y="982132"/>
+            <a:ext cx="5805194" cy="1303867"/>
+          </a:xfrm>
+        </p:spPr>
+        <p:txBody>
+          <a:bodyPr/>
+          <a:lstStyle/>
+          <a:p>
+            <a:r>
+              <a:rPr lang="en-US" dirty="0"/>
+              <a:t>Fake news migration</a:t>
+            </a:r>
+          </a:p>
+        </p:txBody>
+      </p:sp>
+      <p:pic>
+        <p:nvPicPr>
+          <p:cNvPr id="5" name="Content Placeholder 4" descr="A group of people around each other&#10;&#10;Description generated with high confidence">
+            <a:extLst>
+              <a:ext uri="{FF2B5EF4-FFF2-40B4-BE49-F238E27FC236}">
+                <a16:creationId xmlns:a16="http://schemas.microsoft.com/office/drawing/2014/main" id="{FE5A32D8-AAEE-4AF0-BEAE-9E6803B4ABA1}"/>
+              </a:ext>
+            </a:extLst>
+          </p:cNvPr>
+          <p:cNvPicPr>
+            <a:picLocks noGrp="1" noChangeAspect="1"/>
+          </p:cNvPicPr>
+          <p:nvPr>
+            <p:ph idx="1"/>
+          </p:nvPr>
+        </p:nvPicPr>
+        <p:blipFill>
+          <a:blip r:embed="rId2">
+            <a:extLst>
+              <a:ext uri="{28A0092B-C50C-407E-A947-70E740481C1C}">
+                <a14:useLocalDpi xmlns:a14="http://schemas.microsoft.com/office/drawing/2010/main" val="0"/>
+              </a:ext>
+            </a:extLst>
+          </a:blip>
+          <a:stretch>
+            <a:fillRect/>
+          </a:stretch>
+        </p:blipFill>
+        <p:spPr>
+          <a:xfrm>
+            <a:off x="7371835" y="819909"/>
+            <a:ext cx="3524763" cy="5218182"/>
+          </a:xfrm>
+        </p:spPr>
+      </p:pic>
+      <p:sp>
+        <p:nvSpPr>
+          <p:cNvPr id="7" name="Rectangle 6">
+            <a:extLst>
+              <a:ext uri="{FF2B5EF4-FFF2-40B4-BE49-F238E27FC236}">
+                <a16:creationId xmlns:a16="http://schemas.microsoft.com/office/drawing/2014/main" id="{38756425-9E29-4735-887B-50C373C9A45B}"/>
+              </a:ext>
+            </a:extLst>
+          </p:cNvPr>
+          <p:cNvSpPr/>
+          <p:nvPr/>
+        </p:nvSpPr>
+        <p:spPr>
+          <a:xfrm>
+            <a:off x="9134216" y="4161452"/>
+            <a:ext cx="183502" cy="93306"/>
+          </a:xfrm>
+          <a:prstGeom prst="rect">
+            <a:avLst/>
+          </a:prstGeom>
+        </p:spPr>
+        <p:style>
+          <a:lnRef idx="2">
+            <a:schemeClr val="accent1">
+              <a:shade val="50000"/>
+            </a:schemeClr>
+          </a:lnRef>
+          <a:fillRef idx="1">
+            <a:schemeClr val="accent1"/>
+          </a:fillRef>
+          <a:effectRef idx="0">
+            <a:schemeClr val="accent1"/>
+          </a:effectRef>
+          <a:fontRef idx="minor">
+            <a:schemeClr val="lt1"/>
+          </a:fontRef>
+        </p:style>
+        <p:txBody>
+          <a:bodyPr rtlCol="0" anchor="ctr"/>
+          <a:lstStyle/>
+          <a:p>
+            <a:pPr algn="ctr"/>
+            <a:endParaRPr lang="en-US"/>
+          </a:p>
+        </p:txBody>
+      </p:sp>
+      <p:sp>
+        <p:nvSpPr>
+          <p:cNvPr id="8" name="Content Placeholder 2">
+            <a:extLst>
+              <a:ext uri="{FF2B5EF4-FFF2-40B4-BE49-F238E27FC236}">
+                <a16:creationId xmlns:a16="http://schemas.microsoft.com/office/drawing/2014/main" id="{987845CE-0108-43B3-A0B7-CA7DA830665B}"/>
+              </a:ext>
+            </a:extLst>
+          </p:cNvPr>
+          <p:cNvSpPr txBox="1">
+            <a:spLocks/>
+          </p:cNvSpPr>
+          <p:nvPr/>
+        </p:nvSpPr>
+        <p:spPr>
+          <a:xfrm>
+            <a:off x="1295401" y="2556932"/>
+            <a:ext cx="6010468" cy="3318936"/>
+          </a:xfrm>
+          <a:prstGeom prst="rect">
+            <a:avLst/>
+          </a:prstGeom>
+        </p:spPr>
+        <p:txBody>
+          <a:bodyPr vert="horz" lIns="91440" tIns="45720" rIns="91440" bIns="45720" rtlCol="0" anchor="t">
+            <a:normAutofit/>
+          </a:bodyPr>
+          <a:lstStyle>
+            <a:lvl1pPr marL="285750" indent="-285750" algn="l" defTabSz="457200" rtl="0" eaLnBrk="1" latinLnBrk="0" hangingPunct="1">
+              <a:spcBef>
+                <a:spcPct val="20000"/>
+              </a:spcBef>
+              <a:spcAft>
+                <a:spcPts val="600"/>
+              </a:spcAft>
+              <a:buClr>
+                <a:schemeClr val="accent1"/>
+              </a:buClr>
+              <a:buSzPct val="115000"/>
+              <a:buFont typeface="Arial"/>
+              <a:buChar char="•"/>
+              <a:defRPr sz="2400" kern="1200" cap="none">
+                <a:solidFill>
+                  <a:schemeClr val="tx1">
+                    <a:lumMod val="85000"/>
+                    <a:lumOff val="15000"/>
+                  </a:schemeClr>
+                </a:solidFill>
+                <a:effectLst/>
+                <a:latin typeface="+mn-lt"/>
+                <a:ea typeface="+mn-ea"/>
+                <a:cs typeface="+mn-cs"/>
+              </a:defRPr>
+            </a:lvl1pPr>
+            <a:lvl2pPr marL="742950" indent="-285750" algn="l" defTabSz="457200" rtl="0" eaLnBrk="1" latinLnBrk="0" hangingPunct="1">
+              <a:spcBef>
+                <a:spcPct val="20000"/>
+              </a:spcBef>
+              <a:spcAft>
+                <a:spcPts val="600"/>
+              </a:spcAft>
+              <a:buClr>
+                <a:schemeClr val="accent1"/>
+              </a:buClr>
+              <a:buSzPct val="115000"/>
+              <a:buFont typeface="Arial"/>
+              <a:buChar char="•"/>
+              <a:defRPr sz="2000" kern="1200" cap="none">
+                <a:solidFill>
+                  <a:schemeClr val="tx1">
+                    <a:lumMod val="85000"/>
+                    <a:lumOff val="15000"/>
+                  </a:schemeClr>
+                </a:solidFill>
+                <a:effectLst/>
+                <a:latin typeface="+mn-lt"/>
+                <a:ea typeface="+mn-ea"/>
+                <a:cs typeface="+mn-cs"/>
+              </a:defRPr>
+            </a:lvl2pPr>
+            <a:lvl3pPr marL="1200150" indent="-285750" algn="l" defTabSz="457200" rtl="0" eaLnBrk="1" latinLnBrk="0" hangingPunct="1">
+              <a:spcBef>
+                <a:spcPct val="20000"/>
+              </a:spcBef>
+              <a:spcAft>
+                <a:spcPts val="600"/>
+              </a:spcAft>
+              <a:buClr>
+                <a:schemeClr val="accent1"/>
+              </a:buClr>
+              <a:buSzPct val="115000"/>
+              <a:buFont typeface="Arial"/>
+              <a:buChar char="•"/>
+              <a:defRPr sz="1800" kern="1200" cap="none">
+                <a:solidFill>
+                  <a:schemeClr val="tx1">
+                    <a:lumMod val="85000"/>
+                    <a:lumOff val="15000"/>
+                  </a:schemeClr>
+                </a:solidFill>
+                <a:effectLst/>
+                <a:latin typeface="+mn-lt"/>
+                <a:ea typeface="+mn-ea"/>
+                <a:cs typeface="+mn-cs"/>
+              </a:defRPr>
+            </a:lvl3pPr>
+            <a:lvl4pPr marL="1543050" indent="-171450" algn="l" defTabSz="457200" rtl="0" eaLnBrk="1" latinLnBrk="0" hangingPunct="1">
+              <a:spcBef>
+                <a:spcPct val="20000"/>
+              </a:spcBef>
+              <a:spcAft>
+                <a:spcPts val="600"/>
+              </a:spcAft>
+              <a:buClr>
+                <a:schemeClr val="accent1"/>
+              </a:buClr>
+              <a:buSzPct val="115000"/>
+              <a:buFont typeface="Arial"/>
+              <a:buChar char="•"/>
+              <a:defRPr sz="1600" kern="1200" cap="none">
+                <a:solidFill>
+                  <a:schemeClr val="tx1">
+                    <a:lumMod val="85000"/>
+                    <a:lumOff val="15000"/>
+                  </a:schemeClr>
+                </a:solidFill>
+                <a:effectLst/>
+                <a:latin typeface="+mn-lt"/>
+                <a:ea typeface="+mn-ea"/>
+                <a:cs typeface="+mn-cs"/>
+              </a:defRPr>
+            </a:lvl4pPr>
+            <a:lvl5pPr marL="2000250" indent="-171450" algn="l" defTabSz="457200" rtl="0" eaLnBrk="1" latinLnBrk="0" hangingPunct="1">
+              <a:spcBef>
+                <a:spcPct val="20000"/>
+              </a:spcBef>
+              <a:spcAft>
+                <a:spcPts val="600"/>
+              </a:spcAft>
+              <a:buClr>
+                <a:schemeClr val="accent1"/>
+              </a:buClr>
+              <a:buSzPct val="115000"/>
+              <a:buFont typeface="Arial"/>
+              <a:buChar char="•"/>
+              <a:defRPr sz="1400" kern="1200" cap="none">
+                <a:solidFill>
+                  <a:schemeClr val="tx1">
+                    <a:lumMod val="85000"/>
+                    <a:lumOff val="15000"/>
+                  </a:schemeClr>
+                </a:solidFill>
+                <a:effectLst/>
+                <a:latin typeface="+mn-lt"/>
+                <a:ea typeface="+mn-ea"/>
+                <a:cs typeface="+mn-cs"/>
+              </a:defRPr>
+            </a:lvl5pPr>
+            <a:lvl6pPr marL="2514600" indent="-228600" algn="l" defTabSz="457200" rtl="0" eaLnBrk="1" latinLnBrk="0" hangingPunct="1">
+              <a:spcBef>
+                <a:spcPct val="20000"/>
+              </a:spcBef>
+              <a:spcAft>
+                <a:spcPts val="600"/>
+              </a:spcAft>
+              <a:buClr>
+                <a:schemeClr val="accent1"/>
+              </a:buClr>
+              <a:buSzPct val="115000"/>
+              <a:buFont typeface="Arial"/>
+              <a:buChar char="•"/>
+              <a:defRPr sz="1400" kern="1200" cap="none">
+                <a:solidFill>
+                  <a:schemeClr val="tx1">
+                    <a:lumMod val="85000"/>
+                    <a:lumOff val="15000"/>
+                  </a:schemeClr>
+                </a:solidFill>
+                <a:effectLst/>
+                <a:latin typeface="+mn-lt"/>
+                <a:ea typeface="+mn-ea"/>
+                <a:cs typeface="+mn-cs"/>
+              </a:defRPr>
+            </a:lvl6pPr>
+            <a:lvl7pPr marL="2971800" indent="-228600" algn="l" defTabSz="457200" rtl="0" eaLnBrk="1" latinLnBrk="0" hangingPunct="1">
+              <a:spcBef>
+                <a:spcPct val="20000"/>
+              </a:spcBef>
+              <a:spcAft>
+                <a:spcPts val="600"/>
+              </a:spcAft>
+              <a:buClr>
+                <a:schemeClr val="accent1"/>
+              </a:buClr>
+              <a:buSzPct val="115000"/>
+              <a:buFont typeface="Arial"/>
+              <a:buChar char="•"/>
+              <a:defRPr sz="1400" kern="1200" cap="none">
+                <a:solidFill>
+                  <a:schemeClr val="tx1">
+                    <a:lumMod val="85000"/>
+                    <a:lumOff val="15000"/>
+                  </a:schemeClr>
+                </a:solidFill>
+                <a:effectLst/>
+                <a:latin typeface="+mn-lt"/>
+                <a:ea typeface="+mn-ea"/>
+                <a:cs typeface="+mn-cs"/>
+              </a:defRPr>
+            </a:lvl7pPr>
+            <a:lvl8pPr marL="3429000" indent="-228600" algn="l" defTabSz="457200" rtl="0" eaLnBrk="1" latinLnBrk="0" hangingPunct="1">
+              <a:spcBef>
+                <a:spcPct val="20000"/>
+              </a:spcBef>
+              <a:spcAft>
+                <a:spcPts val="600"/>
+              </a:spcAft>
+              <a:buClr>
+                <a:schemeClr val="accent1"/>
+              </a:buClr>
+              <a:buSzPct val="115000"/>
+              <a:buFont typeface="Arial"/>
+              <a:buChar char="•"/>
+              <a:defRPr sz="1400" kern="1200" cap="none">
+                <a:solidFill>
+                  <a:schemeClr val="tx1">
+                    <a:lumMod val="85000"/>
+                    <a:lumOff val="15000"/>
+                  </a:schemeClr>
+                </a:solidFill>
+                <a:effectLst/>
+                <a:latin typeface="+mn-lt"/>
+                <a:ea typeface="+mn-ea"/>
+                <a:cs typeface="+mn-cs"/>
+              </a:defRPr>
+            </a:lvl8pPr>
+            <a:lvl9pPr marL="3886200" indent="-228600" algn="l" defTabSz="457200" rtl="0" eaLnBrk="1" latinLnBrk="0" hangingPunct="1">
+              <a:spcBef>
+                <a:spcPct val="20000"/>
+              </a:spcBef>
+              <a:spcAft>
+                <a:spcPts val="600"/>
+              </a:spcAft>
+              <a:buClr>
+                <a:schemeClr val="accent1"/>
+              </a:buClr>
+              <a:buSzPct val="115000"/>
+              <a:buFont typeface="Arial"/>
+              <a:buChar char="•"/>
+              <a:defRPr sz="1400" kern="1200" cap="none">
+                <a:solidFill>
+                  <a:schemeClr val="tx1">
+                    <a:lumMod val="85000"/>
+                    <a:lumOff val="15000"/>
+                  </a:schemeClr>
+                </a:solidFill>
+                <a:effectLst/>
+                <a:latin typeface="+mn-lt"/>
+                <a:ea typeface="+mn-ea"/>
+                <a:cs typeface="+mn-cs"/>
+              </a:defRPr>
+            </a:lvl9pPr>
+          </a:lstStyle>
+          <a:p>
+            <a:pPr marL="0" indent="0">
+              <a:buFont typeface="Arial"/>
+              <a:buNone/>
+            </a:pPr>
+            <a:endParaRPr lang="en-US" dirty="0"/>
+          </a:p>
+        </p:txBody>
+      </p:sp>
+      <p:sp>
+        <p:nvSpPr>
+          <p:cNvPr id="9" name="TextBox 8">
+            <a:extLst>
+              <a:ext uri="{FF2B5EF4-FFF2-40B4-BE49-F238E27FC236}">
+                <a16:creationId xmlns:a16="http://schemas.microsoft.com/office/drawing/2014/main" id="{1522464D-9405-4CEE-B657-73AA879EE61C}"/>
+              </a:ext>
+            </a:extLst>
+          </p:cNvPr>
+          <p:cNvSpPr txBox="1"/>
+          <p:nvPr/>
+        </p:nvSpPr>
+        <p:spPr>
+          <a:xfrm>
+            <a:off x="1295401" y="2448222"/>
+            <a:ext cx="4488676" cy="1200329"/>
+          </a:xfrm>
+          <a:prstGeom prst="rect">
+            <a:avLst/>
+          </a:prstGeom>
+          <a:noFill/>
+        </p:spPr>
+        <p:txBody>
+          <a:bodyPr wrap="square" rtlCol="0">
+            <a:spAutoFit/>
+          </a:bodyPr>
+          <a:lstStyle/>
+          <a:p>
+            <a:r>
+              <a:rPr lang="en-US" dirty="0"/>
+              <a:t>“Young audiences were more likely to use WhatsApp, Instagram and Snapchat for news, partly because there was a growing desire to discuss news in relative privacy”</a:t>
+            </a:r>
+          </a:p>
+        </p:txBody>
+      </p:sp>
+    </p:spTree>
+    <p:extLst>
+      <p:ext uri="{BB962C8B-B14F-4D97-AF65-F5344CB8AC3E}">
+        <p14:creationId xmlns:p14="http://schemas.microsoft.com/office/powerpoint/2010/main" val="3769623573"/>
+      </p:ext>
+    </p:extLst>
+  </p:cSld>
+  <p:clrMapOvr>
+    <a:masterClrMapping/>
+  </p:clrMapOvr>
+</p:sld>
+</file>
+
+<file path=ppt/slides/slide13.xml><?xml version="1.0" encoding="utf-8"?>
+<p:sld xmlns:a="http://schemas.openxmlformats.org/drawingml/2006/main" xmlns:r="http://schemas.openxmlformats.org/officeDocument/2006/relationships" xmlns:p="http://schemas.openxmlformats.org/presentationml/2006/main">
+  <p:cSld>
+    <p:bg>
+      <p:bgPr>
+        <a:blipFill>
+          <a:blip r:embed="rId2">
+            <a:extLst/>
+          </a:blip>
+          <a:stretch/>
+        </a:blipFill>
+        <a:effectLst/>
+      </p:bgPr>
+    </p:bg>
+    <p:spTree>
+      <p:nvGrpSpPr>
+        <p:cNvPr id="1" name=""/>
+        <p:cNvGrpSpPr/>
+        <p:nvPr/>
+      </p:nvGrpSpPr>
+      <p:grpSpPr>
+        <a:xfrm>
+          <a:off x="0" y="0"/>
+          <a:ext cx="0" cy="0"/>
+          <a:chOff x="0" y="0"/>
+          <a:chExt cx="0" cy="0"/>
+        </a:xfrm>
+      </p:grpSpPr>
+      <p:sp>
+        <p:nvSpPr>
+          <p:cNvPr id="2" name="Title 1">
+            <a:extLst>
+              <a:ext uri="{FF2B5EF4-FFF2-40B4-BE49-F238E27FC236}">
+                <a16:creationId xmlns:a16="http://schemas.microsoft.com/office/drawing/2014/main" id="{BD553D38-4F07-4D16-BE38-1418F465FCE5}"/>
+              </a:ext>
+            </a:extLst>
+          </p:cNvPr>
+          <p:cNvSpPr>
+            <a:spLocks noGrp="1"/>
+          </p:cNvSpPr>
+          <p:nvPr>
+            <p:ph type="title"/>
+          </p:nvPr>
+        </p:nvSpPr>
+        <p:spPr>
+          <a:xfrm>
+            <a:off x="1295402" y="982132"/>
+            <a:ext cx="9601196" cy="1303867"/>
+          </a:xfrm>
+        </p:spPr>
+        <p:txBody>
+          <a:bodyPr>
+            <a:normAutofit/>
+          </a:bodyPr>
+          <a:lstStyle/>
+          <a:p>
+            <a:r>
+              <a:rPr lang="en-US" dirty="0">
+                <a:solidFill>
+                  <a:srgbClr val="262626"/>
+                </a:solidFill>
+              </a:rPr>
+              <a:t>Application</a:t>
+            </a:r>
+          </a:p>
+        </p:txBody>
+      </p:sp>
+      <p:sp>
+        <p:nvSpPr>
+          <p:cNvPr id="3" name="Content Placeholder 2">
+            <a:extLst>
+              <a:ext uri="{FF2B5EF4-FFF2-40B4-BE49-F238E27FC236}">
+                <a16:creationId xmlns:a16="http://schemas.microsoft.com/office/drawing/2014/main" id="{9C1C78E6-F716-498E-A20E-488DB36BA08A}"/>
+              </a:ext>
+            </a:extLst>
+          </p:cNvPr>
+          <p:cNvSpPr>
+            <a:spLocks noGrp="1"/>
+          </p:cNvSpPr>
+          <p:nvPr>
+            <p:ph idx="1"/>
+          </p:nvPr>
+        </p:nvSpPr>
+        <p:spPr>
+          <a:xfrm>
+            <a:off x="1295401" y="2556932"/>
+            <a:ext cx="7829143" cy="3318936"/>
+          </a:xfrm>
+        </p:spPr>
+        <p:txBody>
+          <a:bodyPr>
+            <a:normAutofit fontScale="92500"/>
+          </a:bodyPr>
+          <a:lstStyle/>
+          <a:p>
+            <a:pPr>
+              <a:lnSpc>
+                <a:spcPct val="90000"/>
+              </a:lnSpc>
+            </a:pPr>
+            <a:r>
+              <a:rPr lang="en-US" dirty="0">
+                <a:solidFill>
+                  <a:srgbClr val="262626"/>
+                </a:solidFill>
+              </a:rPr>
+              <a:t>Our chatbot:</a:t>
+            </a:r>
+          </a:p>
+          <a:p>
+            <a:pPr lvl="1">
+              <a:lnSpc>
+                <a:spcPct val="90000"/>
+              </a:lnSpc>
+            </a:pPr>
+            <a:r>
+              <a:rPr lang="en-US" dirty="0">
+                <a:solidFill>
+                  <a:srgbClr val="262626"/>
+                </a:solidFill>
+              </a:rPr>
+              <a:t>Provides an easy means of fact-checking</a:t>
+            </a:r>
+          </a:p>
+          <a:p>
+            <a:pPr lvl="1">
+              <a:lnSpc>
+                <a:spcPct val="90000"/>
+              </a:lnSpc>
+            </a:pPr>
+            <a:r>
+              <a:rPr lang="en-US" dirty="0">
+                <a:solidFill>
+                  <a:srgbClr val="262626"/>
+                </a:solidFill>
+              </a:rPr>
+              <a:t>Disrupts echo chambers by broadcasting news source to other members in the same chat</a:t>
+            </a:r>
+          </a:p>
+          <a:p>
+            <a:pPr lvl="1">
+              <a:lnSpc>
+                <a:spcPct val="90000"/>
+              </a:lnSpc>
+            </a:pPr>
+            <a:r>
+              <a:rPr lang="en-US" dirty="0">
+                <a:solidFill>
+                  <a:srgbClr val="262626"/>
+                </a:solidFill>
+              </a:rPr>
+              <a:t>Can be easily extended to include data from other sources</a:t>
+            </a:r>
+          </a:p>
+          <a:p>
+            <a:pPr lvl="1">
+              <a:lnSpc>
+                <a:spcPct val="90000"/>
+              </a:lnSpc>
+            </a:pPr>
+            <a:r>
+              <a:rPr lang="en-US" dirty="0">
+                <a:solidFill>
+                  <a:srgbClr val="262626"/>
+                </a:solidFill>
+              </a:rPr>
+              <a:t>Can be easily extended to include </a:t>
+            </a:r>
+            <a:r>
+              <a:rPr lang="en-US">
+                <a:solidFill>
+                  <a:srgbClr val="262626"/>
+                </a:solidFill>
+              </a:rPr>
+              <a:t>other topics</a:t>
+            </a:r>
+            <a:endParaRPr lang="en-US" dirty="0">
+              <a:solidFill>
+                <a:srgbClr val="262626"/>
+              </a:solidFill>
+            </a:endParaRPr>
+          </a:p>
+          <a:p>
+            <a:pPr lvl="1">
+              <a:lnSpc>
+                <a:spcPct val="90000"/>
+              </a:lnSpc>
+            </a:pPr>
+            <a:r>
+              <a:rPr lang="en-US" dirty="0">
+                <a:solidFill>
+                  <a:srgbClr val="262626"/>
+                </a:solidFill>
+              </a:rPr>
+              <a:t>Can be easily extended to other chatbot APIs from other messaging apps</a:t>
+            </a:r>
+          </a:p>
+          <a:p>
+            <a:pPr lvl="1">
+              <a:lnSpc>
+                <a:spcPct val="90000"/>
+              </a:lnSpc>
+            </a:pPr>
+            <a:r>
+              <a:rPr lang="en-US" dirty="0">
+                <a:solidFill>
+                  <a:srgbClr val="262626"/>
+                </a:solidFill>
+              </a:rPr>
+              <a:t>Can be extended to monitor trending rumors against protected Named Entities</a:t>
+            </a:r>
+          </a:p>
+        </p:txBody>
+      </p:sp>
+      <p:pic>
+        <p:nvPicPr>
+          <p:cNvPr id="5" name="Picture 4" descr="A close up of a logo&#10;&#10;Description generated with very high confidence">
+            <a:extLst>
+              <a:ext uri="{FF2B5EF4-FFF2-40B4-BE49-F238E27FC236}">
+                <a16:creationId xmlns:a16="http://schemas.microsoft.com/office/drawing/2014/main" id="{87E269AD-AA9A-40DD-99E7-E38DFA712F2A}"/>
+              </a:ext>
+            </a:extLst>
+          </p:cNvPr>
+          <p:cNvPicPr>
+            <a:picLocks noChangeAspect="1"/>
+          </p:cNvPicPr>
+          <p:nvPr/>
+        </p:nvPicPr>
+        <p:blipFill>
+          <a:blip r:embed="rId3">
+            <a:extLst>
+              <a:ext uri="{28A0092B-C50C-407E-A947-70E740481C1C}">
+                <a14:useLocalDpi xmlns:a14="http://schemas.microsoft.com/office/drawing/2010/main" val="0"/>
+              </a:ext>
+            </a:extLst>
+          </a:blip>
+          <a:stretch>
+            <a:fillRect/>
+          </a:stretch>
+        </p:blipFill>
+        <p:spPr>
+          <a:xfrm>
+            <a:off x="9879933" y="4572002"/>
+            <a:ext cx="1421475" cy="1421475"/>
+          </a:xfrm>
+          <a:prstGeom prst="rect">
+            <a:avLst/>
+          </a:prstGeom>
+          <a:ln w="57150" cmpd="thickThin">
+            <a:solidFill>
+              <a:srgbClr val="7F7F7F"/>
+            </a:solidFill>
+            <a:miter lim="800000"/>
+          </a:ln>
+        </p:spPr>
+      </p:pic>
+    </p:spTree>
+    <p:extLst>
+      <p:ext uri="{BB962C8B-B14F-4D97-AF65-F5344CB8AC3E}">
+        <p14:creationId xmlns:p14="http://schemas.microsoft.com/office/powerpoint/2010/main" val="32652585"/>
       </p:ext>
     </p:extLst>
   </p:cSld>
@@ -10154,6 +11177,89 @@
           <p:cNvPr id="2" name="Title 1">
             <a:extLst>
               <a:ext uri="{FF2B5EF4-FFF2-40B4-BE49-F238E27FC236}">
+                <a16:creationId xmlns:a16="http://schemas.microsoft.com/office/drawing/2014/main" id="{27EA3803-75B3-4C55-85D2-6DE4D3E4C95D}"/>
+              </a:ext>
+            </a:extLst>
+          </p:cNvPr>
+          <p:cNvSpPr>
+            <a:spLocks noGrp="1"/>
+          </p:cNvSpPr>
+          <p:nvPr>
+            <p:ph type="title"/>
+          </p:nvPr>
+        </p:nvSpPr>
+        <p:spPr/>
+        <p:txBody>
+          <a:bodyPr/>
+          <a:lstStyle/>
+          <a:p>
+            <a:r>
+              <a:rPr lang="en-US" dirty="0"/>
+              <a:t>Article Scrapping (Finance &amp; Investment)</a:t>
+            </a:r>
+          </a:p>
+        </p:txBody>
+      </p:sp>
+      <p:sp>
+        <p:nvSpPr>
+          <p:cNvPr id="3" name="Content Placeholder 2">
+            <a:extLst>
+              <a:ext uri="{FF2B5EF4-FFF2-40B4-BE49-F238E27FC236}">
+                <a16:creationId xmlns:a16="http://schemas.microsoft.com/office/drawing/2014/main" id="{1BC4E6E5-4FE9-44AD-AA40-CD4209EF4BB5}"/>
+              </a:ext>
+            </a:extLst>
+          </p:cNvPr>
+          <p:cNvSpPr>
+            <a:spLocks noGrp="1"/>
+          </p:cNvSpPr>
+          <p:nvPr>
+            <p:ph idx="1"/>
+          </p:nvPr>
+        </p:nvSpPr>
+        <p:spPr/>
+        <p:txBody>
+          <a:bodyPr/>
+          <a:lstStyle/>
+          <a:p>
+            <a:endParaRPr lang="en-US" dirty="0"/>
+          </a:p>
+        </p:txBody>
+      </p:sp>
+    </p:spTree>
+    <p:extLst>
+      <p:ext uri="{BB962C8B-B14F-4D97-AF65-F5344CB8AC3E}">
+        <p14:creationId xmlns:p14="http://schemas.microsoft.com/office/powerpoint/2010/main" val="2784847145"/>
+      </p:ext>
+    </p:extLst>
+  </p:cSld>
+  <p:clrMapOvr>
+    <a:masterClrMapping/>
+  </p:clrMapOvr>
+</p:sld>
+</file>
+
+<file path=ppt/slides/slide5.xml><?xml version="1.0" encoding="utf-8"?>
+<p:sld xmlns:a="http://schemas.openxmlformats.org/drawingml/2006/main" xmlns:r="http://schemas.openxmlformats.org/officeDocument/2006/relationships" xmlns:p="http://schemas.openxmlformats.org/presentationml/2006/main">
+  <p:cSld>
+    <p:spTree>
+      <p:nvGrpSpPr>
+        <p:cNvPr id="1" name=""/>
+        <p:cNvGrpSpPr/>
+        <p:nvPr/>
+      </p:nvGrpSpPr>
+      <p:grpSpPr>
+        <a:xfrm>
+          <a:off x="0" y="0"/>
+          <a:ext cx="0" cy="0"/>
+          <a:chOff x="0" y="0"/>
+          <a:chExt cx="0" cy="0"/>
+        </a:xfrm>
+      </p:grpSpPr>
+      <p:sp>
+        <p:nvSpPr>
+          <p:cNvPr id="2" name="Title 1">
+            <a:extLst>
+              <a:ext uri="{FF2B5EF4-FFF2-40B4-BE49-F238E27FC236}">
                 <a16:creationId xmlns:a16="http://schemas.microsoft.com/office/drawing/2014/main" id="{6C2224FE-A1FF-4D77-9E7C-AC86716FC5DB}"/>
               </a:ext>
             </a:extLst>
@@ -10253,7 +11359,130 @@
 </p:sld>
 </file>
 
-<file path=ppt/slides/slide5.xml><?xml version="1.0" encoding="utf-8"?>
+<file path=ppt/slides/slide6.xml><?xml version="1.0" encoding="utf-8"?>
+<p:sld xmlns:a="http://schemas.openxmlformats.org/drawingml/2006/main" xmlns:r="http://schemas.openxmlformats.org/officeDocument/2006/relationships" xmlns:p="http://schemas.openxmlformats.org/presentationml/2006/main">
+  <p:cSld>
+    <p:spTree>
+      <p:nvGrpSpPr>
+        <p:cNvPr id="1" name=""/>
+        <p:cNvGrpSpPr/>
+        <p:nvPr/>
+      </p:nvGrpSpPr>
+      <p:grpSpPr>
+        <a:xfrm>
+          <a:off x="0" y="0"/>
+          <a:ext cx="0" cy="0"/>
+          <a:chOff x="0" y="0"/>
+          <a:chExt cx="0" cy="0"/>
+        </a:xfrm>
+      </p:grpSpPr>
+      <p:sp>
+        <p:nvSpPr>
+          <p:cNvPr id="2" name="Title 1">
+            <a:extLst>
+              <a:ext uri="{FF2B5EF4-FFF2-40B4-BE49-F238E27FC236}">
+                <a16:creationId xmlns:a16="http://schemas.microsoft.com/office/drawing/2014/main" id="{FD417093-0AB9-4355-9857-88A66B4E11F1}"/>
+              </a:ext>
+            </a:extLst>
+          </p:cNvPr>
+          <p:cNvSpPr>
+            <a:spLocks noGrp="1"/>
+          </p:cNvSpPr>
+          <p:nvPr>
+            <p:ph type="title"/>
+          </p:nvPr>
+        </p:nvSpPr>
+        <p:spPr/>
+        <p:txBody>
+          <a:bodyPr/>
+          <a:lstStyle/>
+          <a:p>
+            <a:r>
+              <a:rPr lang="en-US" dirty="0"/>
+              <a:t>Singlish paraphrasing</a:t>
+            </a:r>
+          </a:p>
+        </p:txBody>
+      </p:sp>
+      <p:sp>
+        <p:nvSpPr>
+          <p:cNvPr id="3" name="Content Placeholder 2">
+            <a:extLst>
+              <a:ext uri="{FF2B5EF4-FFF2-40B4-BE49-F238E27FC236}">
+                <a16:creationId xmlns:a16="http://schemas.microsoft.com/office/drawing/2014/main" id="{6AE8DA38-0E4A-430E-9FA0-F22D689B1399}"/>
+              </a:ext>
+            </a:extLst>
+          </p:cNvPr>
+          <p:cNvSpPr>
+            <a:spLocks noGrp="1"/>
+          </p:cNvSpPr>
+          <p:nvPr>
+            <p:ph idx="1"/>
+          </p:nvPr>
+        </p:nvSpPr>
+        <p:spPr/>
+        <p:txBody>
+          <a:bodyPr/>
+          <a:lstStyle/>
+          <a:p>
+            <a:r>
+              <a:rPr lang="en-US" dirty="0"/>
+              <a:t>Singlish words are paraphrased from a dictionary found at </a:t>
+            </a:r>
+            <a:r>
+              <a:rPr lang="en-US" sz="1200" dirty="0">
+                <a:hlinkClick r:id="rId2"/>
+              </a:rPr>
+              <a:t>https://remembersingapore.org/2011/08/21/best-of-singlish-words-and-phrases/</a:t>
+            </a:r>
+            <a:endParaRPr lang="en-US" sz="1200" dirty="0"/>
+          </a:p>
+          <a:p>
+            <a:pPr lvl="1"/>
+            <a:r>
+              <a:rPr lang="en-US" dirty="0"/>
+              <a:t>ah </a:t>
+            </a:r>
+            <a:r>
+              <a:rPr lang="en-US" dirty="0" err="1"/>
+              <a:t>lian</a:t>
+            </a:r>
+            <a:r>
+              <a:rPr lang="en-US" dirty="0"/>
+              <a:t> 		-&gt; 	teenage female hooligan</a:t>
+            </a:r>
+          </a:p>
+          <a:p>
+            <a:pPr lvl="1"/>
+            <a:r>
+              <a:rPr lang="en-US" dirty="0"/>
+              <a:t>kay </a:t>
+            </a:r>
+            <a:r>
+              <a:rPr lang="en-US" dirty="0" err="1"/>
+              <a:t>poh</a:t>
+            </a:r>
+            <a:r>
+              <a:rPr lang="en-US" dirty="0"/>
+              <a:t> 		-&gt; 	busybody</a:t>
+            </a:r>
+          </a:p>
+        </p:txBody>
+      </p:sp>
+    </p:spTree>
+    <p:extLst>
+      <p:ext uri="{BB962C8B-B14F-4D97-AF65-F5344CB8AC3E}">
+        <p14:creationId xmlns:p14="http://schemas.microsoft.com/office/powerpoint/2010/main" val="3729790024"/>
+      </p:ext>
+    </p:extLst>
+  </p:cSld>
+  <p:clrMapOvr>
+    <a:masterClrMapping/>
+  </p:clrMapOvr>
+</p:sld>
+</file>
+
+<file path=ppt/slides/slide7.xml><?xml version="1.0" encoding="utf-8"?>
 <p:sld xmlns:a="http://schemas.openxmlformats.org/drawingml/2006/main" xmlns:r="http://schemas.openxmlformats.org/officeDocument/2006/relationships" xmlns:p="http://schemas.openxmlformats.org/presentationml/2006/main">
   <p:cSld>
     <p:spTree>
@@ -10636,305 +11865,6 @@
 </p:sld>
 </file>
 
-<file path=ppt/slides/slide6.xml><?xml version="1.0" encoding="utf-8"?>
-<p:sld xmlns:a="http://schemas.openxmlformats.org/drawingml/2006/main" xmlns:r="http://schemas.openxmlformats.org/officeDocument/2006/relationships" xmlns:p="http://schemas.openxmlformats.org/presentationml/2006/main">
-  <p:cSld>
-    <p:spTree>
-      <p:nvGrpSpPr>
-        <p:cNvPr id="1" name=""/>
-        <p:cNvGrpSpPr/>
-        <p:nvPr/>
-      </p:nvGrpSpPr>
-      <p:grpSpPr>
-        <a:xfrm>
-          <a:off x="0" y="0"/>
-          <a:ext cx="0" cy="0"/>
-          <a:chOff x="0" y="0"/>
-          <a:chExt cx="0" cy="0"/>
-        </a:xfrm>
-      </p:grpSpPr>
-      <p:sp>
-        <p:nvSpPr>
-          <p:cNvPr id="2" name="Title 1">
-            <a:extLst>
-              <a:ext uri="{FF2B5EF4-FFF2-40B4-BE49-F238E27FC236}">
-                <a16:creationId xmlns:a16="http://schemas.microsoft.com/office/drawing/2014/main" id="{9DBFA03A-DADA-4F99-9C0C-8BAB4ED41B58}"/>
-              </a:ext>
-            </a:extLst>
-          </p:cNvPr>
-          <p:cNvSpPr>
-            <a:spLocks noGrp="1"/>
-          </p:cNvSpPr>
-          <p:nvPr>
-            <p:ph type="title"/>
-          </p:nvPr>
-        </p:nvSpPr>
-        <p:spPr/>
-        <p:txBody>
-          <a:bodyPr/>
-          <a:lstStyle/>
-          <a:p>
-            <a:r>
-              <a:rPr lang="en-US" dirty="0"/>
-              <a:t>Relevance to Singapore</a:t>
-            </a:r>
-          </a:p>
-        </p:txBody>
-      </p:sp>
-      <p:pic>
-        <p:nvPicPr>
-          <p:cNvPr id="5" name="Picture 4">
-            <a:extLst>
-              <a:ext uri="{FF2B5EF4-FFF2-40B4-BE49-F238E27FC236}">
-                <a16:creationId xmlns:a16="http://schemas.microsoft.com/office/drawing/2014/main" id="{E0E162BD-9D85-46AA-8243-F3EF8448915D}"/>
-              </a:ext>
-            </a:extLst>
-          </p:cNvPr>
-          <p:cNvPicPr>
-            <a:picLocks noChangeAspect="1"/>
-          </p:cNvPicPr>
-          <p:nvPr/>
-        </p:nvPicPr>
-        <p:blipFill>
-          <a:blip r:embed="rId2">
-            <a:extLst>
-              <a:ext uri="{28A0092B-C50C-407E-A947-70E740481C1C}">
-                <a14:useLocalDpi xmlns:a14="http://schemas.microsoft.com/office/drawing/2010/main" val="0"/>
-              </a:ext>
-            </a:extLst>
-          </a:blip>
-          <a:stretch>
-            <a:fillRect/>
-          </a:stretch>
-        </p:blipFill>
-        <p:spPr>
-          <a:xfrm>
-            <a:off x="3809392" y="2475217"/>
-            <a:ext cx="4284021" cy="3607597"/>
-          </a:xfrm>
-          <a:prstGeom prst="rect">
-            <a:avLst/>
-          </a:prstGeom>
-        </p:spPr>
-      </p:pic>
-    </p:spTree>
-    <p:extLst>
-      <p:ext uri="{BB962C8B-B14F-4D97-AF65-F5344CB8AC3E}">
-        <p14:creationId xmlns:p14="http://schemas.microsoft.com/office/powerpoint/2010/main" val="890265409"/>
-      </p:ext>
-    </p:extLst>
-  </p:cSld>
-  <p:clrMapOvr>
-    <a:masterClrMapping/>
-  </p:clrMapOvr>
-</p:sld>
-</file>
-
-<file path=ppt/slides/slide7.xml><?xml version="1.0" encoding="utf-8"?>
-<p:sld xmlns:a="http://schemas.openxmlformats.org/drawingml/2006/main" xmlns:r="http://schemas.openxmlformats.org/officeDocument/2006/relationships" xmlns:p="http://schemas.openxmlformats.org/presentationml/2006/main">
-  <p:cSld>
-    <p:spTree>
-      <p:nvGrpSpPr>
-        <p:cNvPr id="1" name=""/>
-        <p:cNvGrpSpPr/>
-        <p:nvPr/>
-      </p:nvGrpSpPr>
-      <p:grpSpPr>
-        <a:xfrm>
-          <a:off x="0" y="0"/>
-          <a:ext cx="0" cy="0"/>
-          <a:chOff x="0" y="0"/>
-          <a:chExt cx="0" cy="0"/>
-        </a:xfrm>
-      </p:grpSpPr>
-      <p:pic>
-        <p:nvPicPr>
-          <p:cNvPr id="5" name="Picture 4">
-            <a:extLst>
-              <a:ext uri="{FF2B5EF4-FFF2-40B4-BE49-F238E27FC236}">
-                <a16:creationId xmlns:a16="http://schemas.microsoft.com/office/drawing/2014/main" id="{7B3A1FD9-D7DC-4C43-AB47-8A094B9D528E}"/>
-              </a:ext>
-            </a:extLst>
-          </p:cNvPr>
-          <p:cNvPicPr>
-            <a:picLocks noChangeAspect="1"/>
-          </p:cNvPicPr>
-          <p:nvPr/>
-        </p:nvPicPr>
-        <p:blipFill>
-          <a:blip r:embed="rId2"/>
-          <a:stretch>
-            <a:fillRect/>
-          </a:stretch>
-        </p:blipFill>
-        <p:spPr>
-          <a:xfrm>
-            <a:off x="6828209" y="2616739"/>
-            <a:ext cx="3905250" cy="3267075"/>
-          </a:xfrm>
-          <a:prstGeom prst="rect">
-            <a:avLst/>
-          </a:prstGeom>
-        </p:spPr>
-      </p:pic>
-      <p:sp>
-        <p:nvSpPr>
-          <p:cNvPr id="6" name="Title 1">
-            <a:extLst>
-              <a:ext uri="{FF2B5EF4-FFF2-40B4-BE49-F238E27FC236}">
-                <a16:creationId xmlns:a16="http://schemas.microsoft.com/office/drawing/2014/main" id="{D6023992-794B-48FA-9B10-86769973EB5E}"/>
-              </a:ext>
-            </a:extLst>
-          </p:cNvPr>
-          <p:cNvSpPr>
-            <a:spLocks noGrp="1"/>
-          </p:cNvSpPr>
-          <p:nvPr>
-            <p:ph type="title"/>
-          </p:nvPr>
-        </p:nvSpPr>
-        <p:spPr>
-          <a:xfrm>
-            <a:off x="1295402" y="982132"/>
-            <a:ext cx="9601196" cy="1303867"/>
-          </a:xfrm>
-        </p:spPr>
-        <p:txBody>
-          <a:bodyPr/>
-          <a:lstStyle/>
-          <a:p>
-            <a:r>
-              <a:rPr lang="en-US" dirty="0"/>
-              <a:t>Fake news migration</a:t>
-            </a:r>
-          </a:p>
-        </p:txBody>
-      </p:sp>
-      <p:sp>
-        <p:nvSpPr>
-          <p:cNvPr id="7" name="TextBox 6">
-            <a:extLst>
-              <a:ext uri="{FF2B5EF4-FFF2-40B4-BE49-F238E27FC236}">
-                <a16:creationId xmlns:a16="http://schemas.microsoft.com/office/drawing/2014/main" id="{D97996B0-82B3-4FD9-B1AC-4D3E4DE158A6}"/>
-              </a:ext>
-            </a:extLst>
-          </p:cNvPr>
-          <p:cNvSpPr txBox="1"/>
-          <p:nvPr/>
-        </p:nvSpPr>
-        <p:spPr>
-          <a:xfrm>
-            <a:off x="8005863" y="2363821"/>
-            <a:ext cx="1074140" cy="369332"/>
-          </a:xfrm>
-          <a:prstGeom prst="rect">
-            <a:avLst/>
-          </a:prstGeom>
-          <a:noFill/>
-        </p:spPr>
-        <p:txBody>
-          <a:bodyPr wrap="none" rtlCol="0">
-            <a:spAutoFit/>
-          </a:bodyPr>
-          <a:lstStyle/>
-          <a:p>
-            <a:r>
-              <a:rPr lang="en-US" dirty="0"/>
-              <a:t>Singapore</a:t>
-            </a:r>
-          </a:p>
-        </p:txBody>
-      </p:sp>
-      <p:sp>
-        <p:nvSpPr>
-          <p:cNvPr id="8" name="Content Placeholder 2">
-            <a:extLst>
-              <a:ext uri="{FF2B5EF4-FFF2-40B4-BE49-F238E27FC236}">
-                <a16:creationId xmlns:a16="http://schemas.microsoft.com/office/drawing/2014/main" id="{B7A7F021-5801-4CAF-8768-EA8F85CB98F1}"/>
-              </a:ext>
-            </a:extLst>
-          </p:cNvPr>
-          <p:cNvSpPr>
-            <a:spLocks noGrp="1"/>
-          </p:cNvSpPr>
-          <p:nvPr>
-            <p:ph idx="1"/>
-          </p:nvPr>
-        </p:nvSpPr>
-        <p:spPr>
-          <a:xfrm>
-            <a:off x="1295401" y="2556932"/>
-            <a:ext cx="5290225" cy="2715459"/>
-          </a:xfrm>
-        </p:spPr>
-        <p:txBody>
-          <a:bodyPr/>
-          <a:lstStyle/>
-          <a:p>
-            <a:pPr marL="0" indent="0">
-              <a:buNone/>
-            </a:pPr>
-            <a:r>
-              <a:rPr lang="en-US" dirty="0"/>
-              <a:t>“The use of social media for news has started to fall in a number of key markets — after years of continuous growth. At the same time, we continue to see a rise in the use of messaging apps for news as consumers look for more private (and less confrontational) spaces to communicate.”</a:t>
-            </a:r>
-          </a:p>
-        </p:txBody>
-      </p:sp>
-      <p:sp>
-        <p:nvSpPr>
-          <p:cNvPr id="9" name="TextBox 8">
-            <a:extLst>
-              <a:ext uri="{FF2B5EF4-FFF2-40B4-BE49-F238E27FC236}">
-                <a16:creationId xmlns:a16="http://schemas.microsoft.com/office/drawing/2014/main" id="{D2355833-4D77-4BF9-B640-28C6BDCA0B71}"/>
-              </a:ext>
-            </a:extLst>
-          </p:cNvPr>
-          <p:cNvSpPr txBox="1"/>
-          <p:nvPr/>
-        </p:nvSpPr>
-        <p:spPr>
-          <a:xfrm>
-            <a:off x="2557779" y="5229537"/>
-            <a:ext cx="2928238" cy="646331"/>
-          </a:xfrm>
-          <a:prstGeom prst="rect">
-            <a:avLst/>
-          </a:prstGeom>
-          <a:noFill/>
-        </p:spPr>
-        <p:txBody>
-          <a:bodyPr wrap="none" rtlCol="0">
-            <a:spAutoFit/>
-          </a:bodyPr>
-          <a:lstStyle/>
-          <a:p>
-            <a:r>
-              <a:rPr lang="en-US" dirty="0"/>
-              <a:t>2018 Digital News Reports</a:t>
-            </a:r>
-          </a:p>
-          <a:p>
-            <a:r>
-              <a:rPr lang="en-US" dirty="0"/>
-              <a:t>Published by Reuters Institute</a:t>
-            </a:r>
-          </a:p>
-        </p:txBody>
-      </p:sp>
-    </p:spTree>
-    <p:extLst>
-      <p:ext uri="{BB962C8B-B14F-4D97-AF65-F5344CB8AC3E}">
-        <p14:creationId xmlns:p14="http://schemas.microsoft.com/office/powerpoint/2010/main" val="2461371443"/>
-      </p:ext>
-    </p:extLst>
-  </p:cSld>
-  <p:clrMapOvr>
-    <a:masterClrMapping/>
-  </p:clrMapOvr>
-</p:sld>
-</file>
-
 <file path=ppt/slides/slide8.xml><?xml version="1.0" encoding="utf-8"?>
 <p:sld xmlns:a="http://schemas.openxmlformats.org/drawingml/2006/main" xmlns:r="http://schemas.openxmlformats.org/officeDocument/2006/relationships" xmlns:p="http://schemas.openxmlformats.org/presentationml/2006/main">
   <p:cSld>
@@ -10957,7 +11887,7 @@
           <p:cNvPr id="2" name="Title 1">
             <a:extLst>
               <a:ext uri="{FF2B5EF4-FFF2-40B4-BE49-F238E27FC236}">
-                <a16:creationId xmlns:a16="http://schemas.microsoft.com/office/drawing/2014/main" id="{85C731FC-1ED2-4202-BF87-3E45FF6AEA74}"/>
+                <a16:creationId xmlns:a16="http://schemas.microsoft.com/office/drawing/2014/main" id="{A2757D1C-ADF9-49D8-AB16-ACF65EFB57E7}"/>
               </a:ext>
             </a:extLst>
           </p:cNvPr>
@@ -10968,41 +11898,391 @@
             <p:ph type="title"/>
           </p:nvPr>
         </p:nvSpPr>
-        <p:spPr>
-          <a:xfrm>
-            <a:off x="1295402" y="982132"/>
-            <a:ext cx="5805194" cy="1303867"/>
-          </a:xfrm>
-        </p:spPr>
+        <p:spPr/>
         <p:txBody>
           <a:bodyPr/>
           <a:lstStyle/>
           <a:p>
             <a:r>
               <a:rPr lang="en-US" dirty="0"/>
-              <a:t>Fake news migration</a:t>
-            </a:r>
-          </a:p>
-        </p:txBody>
-      </p:sp>
+              <a:t>Contextual Network Graph (Search)</a:t>
+            </a:r>
+          </a:p>
+        </p:txBody>
+      </p:sp>
+      <mc:AlternateContent xmlns:mc="http://schemas.openxmlformats.org/markup-compatibility/2006">
+        <mc:Choice xmlns:a14="http://schemas.microsoft.com/office/drawing/2010/main" Requires="a14">
+          <p:sp>
+            <p:nvSpPr>
+              <p:cNvPr id="3" name="Content Placeholder 2">
+                <a:extLst>
+                  <a:ext uri="{FF2B5EF4-FFF2-40B4-BE49-F238E27FC236}">
+                    <a16:creationId xmlns:a16="http://schemas.microsoft.com/office/drawing/2014/main" id="{B95FBB89-0F50-49EB-99B3-AE3DF4ED4C14}"/>
+                  </a:ext>
+                </a:extLst>
+              </p:cNvPr>
+              <p:cNvSpPr>
+                <a:spLocks noGrp="1"/>
+              </p:cNvSpPr>
+              <p:nvPr>
+                <p:ph idx="1"/>
+              </p:nvPr>
+            </p:nvSpPr>
+            <p:spPr>
+              <a:xfrm>
+                <a:off x="1120402" y="3191414"/>
+                <a:ext cx="4872134" cy="769397"/>
+              </a:xfrm>
+            </p:spPr>
+            <p:txBody>
+              <a:bodyPr/>
+              <a:lstStyle/>
+              <a:p>
+                <a:pPr marL="0" indent="0">
+                  <a:buNone/>
+                </a:pPr>
+                <a14:m>
+                  <m:oMath xmlns:m="http://schemas.openxmlformats.org/officeDocument/2006/math">
+                    <m:sSub>
+                      <m:sSubPr>
+                        <m:ctrlPr>
+                          <a:rPr lang="en-US" i="1" dirty="0" smtClean="0">
+                            <a:latin typeface="Cambria Math" panose="02040503050406030204" pitchFamily="18" charset="0"/>
+                          </a:rPr>
+                        </m:ctrlPr>
+                      </m:sSubPr>
+                      <m:e>
+                        <m:r>
+                          <a:rPr lang="en-US" i="1" dirty="0">
+                            <a:latin typeface="Cambria Math" panose="02040503050406030204" pitchFamily="18" charset="0"/>
+                          </a:rPr>
+                          <m:t>𝑊𝑒𝑖𝑔h𝑡</m:t>
+                        </m:r>
+                      </m:e>
+                      <m:sub>
+                        <m:r>
+                          <a:rPr lang="en-US" b="0" i="1" dirty="0" smtClean="0">
+                            <a:latin typeface="Cambria Math" panose="02040503050406030204" pitchFamily="18" charset="0"/>
+                          </a:rPr>
+                          <m:t>𝑘</m:t>
+                        </m:r>
+                      </m:sub>
+                    </m:sSub>
+                  </m:oMath>
+                </a14:m>
+                <a:r>
+                  <a:rPr lang="en-US" dirty="0"/>
+                  <a:t> = </a:t>
+                </a:r>
+                <a14:m>
+                  <m:oMath xmlns:m="http://schemas.openxmlformats.org/officeDocument/2006/math">
+                    <m:f>
+                      <m:fPr>
+                        <m:ctrlPr>
+                          <a:rPr lang="en-US" b="0" i="1" smtClean="0">
+                            <a:latin typeface="Cambria Math" panose="02040503050406030204" pitchFamily="18" charset="0"/>
+                          </a:rPr>
+                        </m:ctrlPr>
+                      </m:fPr>
+                      <m:num>
+                        <m:r>
+                          <a:rPr lang="en-US" b="0" i="1" smtClean="0">
+                            <a:latin typeface="Cambria Math" panose="02040503050406030204" pitchFamily="18" charset="0"/>
+                          </a:rPr>
+                          <m:t>2</m:t>
+                        </m:r>
+                        <m:sSup>
+                          <m:sSupPr>
+                            <m:ctrlPr>
+                              <a:rPr lang="en-US" i="1">
+                                <a:latin typeface="Cambria Math" panose="02040503050406030204" pitchFamily="18" charset="0"/>
+                              </a:rPr>
+                            </m:ctrlPr>
+                          </m:sSupPr>
+                          <m:e>
+                            <m:r>
+                              <a:rPr lang="en-US" i="1">
+                                <a:latin typeface="Cambria Math" panose="02040503050406030204" pitchFamily="18" charset="0"/>
+                              </a:rPr>
+                              <m:t>𝑒</m:t>
+                            </m:r>
+                          </m:e>
+                          <m:sup>
+                            <m:sSub>
+                              <m:sSubPr>
+                                <m:ctrlPr>
+                                  <a:rPr lang="en-US" i="1">
+                                    <a:latin typeface="Cambria Math" panose="02040503050406030204" pitchFamily="18" charset="0"/>
+                                  </a:rPr>
+                                </m:ctrlPr>
+                              </m:sSubPr>
+                              <m:e>
+                                <m:r>
+                                  <a:rPr lang="en-US" i="1">
+                                    <a:latin typeface="Cambria Math" panose="02040503050406030204" pitchFamily="18" charset="0"/>
+                                  </a:rPr>
+                                  <m:t>𝑓</m:t>
+                                </m:r>
+                              </m:e>
+                              <m:sub>
+                                <m:r>
+                                  <a:rPr lang="en-US" b="0" i="1" smtClean="0">
+                                    <a:latin typeface="Cambria Math" panose="02040503050406030204" pitchFamily="18" charset="0"/>
+                                  </a:rPr>
+                                  <m:t>𝑘</m:t>
+                                </m:r>
+                              </m:sub>
+                            </m:sSub>
+                          </m:sup>
+                        </m:sSup>
+                      </m:num>
+                      <m:den>
+                        <m:sSup>
+                          <m:sSupPr>
+                            <m:ctrlPr>
+                              <a:rPr lang="en-US" i="1">
+                                <a:latin typeface="Cambria Math" panose="02040503050406030204" pitchFamily="18" charset="0"/>
+                              </a:rPr>
+                            </m:ctrlPr>
+                          </m:sSupPr>
+                          <m:e>
+                            <m:r>
+                              <a:rPr lang="en-US" i="1">
+                                <a:latin typeface="Cambria Math" panose="02040503050406030204" pitchFamily="18" charset="0"/>
+                              </a:rPr>
+                              <m:t>𝑒</m:t>
+                            </m:r>
+                          </m:e>
+                          <m:sup>
+                            <m:r>
+                              <m:rPr>
+                                <m:sty m:val="p"/>
+                              </m:rPr>
+                              <a:rPr lang="en-US" b="0" i="0" smtClean="0">
+                                <a:latin typeface="Cambria Math" panose="02040503050406030204" pitchFamily="18" charset="0"/>
+                              </a:rPr>
+                              <m:t>max</m:t>
+                            </m:r>
+                            <m:r>
+                              <a:rPr lang="en-US" b="0" i="1" smtClean="0">
+                                <a:latin typeface="Cambria Math" panose="02040503050406030204" pitchFamily="18" charset="0"/>
+                              </a:rPr>
+                              <m:t>⁡(</m:t>
+                            </m:r>
+                            <m:sSub>
+                              <m:sSubPr>
+                                <m:ctrlPr>
+                                  <a:rPr lang="en-US" i="1">
+                                    <a:latin typeface="Cambria Math" panose="02040503050406030204" pitchFamily="18" charset="0"/>
+                                  </a:rPr>
+                                </m:ctrlPr>
+                              </m:sSubPr>
+                              <m:e>
+                                <m:r>
+                                  <a:rPr lang="en-US" i="1">
+                                    <a:latin typeface="Cambria Math" panose="02040503050406030204" pitchFamily="18" charset="0"/>
+                                  </a:rPr>
+                                  <m:t>𝑓</m:t>
+                                </m:r>
+                              </m:e>
+                              <m:sub>
+                                <m:r>
+                                  <a:rPr lang="en-US" b="0" i="1" smtClean="0">
+                                    <a:latin typeface="Cambria Math" panose="02040503050406030204" pitchFamily="18" charset="0"/>
+                                  </a:rPr>
+                                  <m:t>1</m:t>
+                                </m:r>
+                              </m:sub>
+                            </m:sSub>
+                            <m:r>
+                              <a:rPr lang="en-US" b="0" i="1" smtClean="0">
+                                <a:latin typeface="Cambria Math" panose="02040503050406030204" pitchFamily="18" charset="0"/>
+                              </a:rPr>
+                              <m:t>, </m:t>
+                            </m:r>
+                            <m:sSub>
+                              <m:sSubPr>
+                                <m:ctrlPr>
+                                  <a:rPr lang="en-US" i="1">
+                                    <a:latin typeface="Cambria Math" panose="02040503050406030204" pitchFamily="18" charset="0"/>
+                                  </a:rPr>
+                                </m:ctrlPr>
+                              </m:sSubPr>
+                              <m:e>
+                                <m:r>
+                                  <a:rPr lang="en-US" i="1">
+                                    <a:latin typeface="Cambria Math" panose="02040503050406030204" pitchFamily="18" charset="0"/>
+                                  </a:rPr>
+                                  <m:t>𝑓</m:t>
+                                </m:r>
+                              </m:e>
+                              <m:sub>
+                                <m:r>
+                                  <a:rPr lang="en-US" b="0" i="1" smtClean="0">
+                                    <a:latin typeface="Cambria Math" panose="02040503050406030204" pitchFamily="18" charset="0"/>
+                                  </a:rPr>
+                                  <m:t>2</m:t>
+                                </m:r>
+                              </m:sub>
+                            </m:sSub>
+                            <m:r>
+                              <a:rPr lang="en-US" b="0" i="1" smtClean="0">
+                                <a:latin typeface="Cambria Math" panose="02040503050406030204" pitchFamily="18" charset="0"/>
+                              </a:rPr>
+                              <m:t>,   …</m:t>
+                            </m:r>
+                            <m:sSub>
+                              <m:sSubPr>
+                                <m:ctrlPr>
+                                  <a:rPr lang="en-US" i="1">
+                                    <a:latin typeface="Cambria Math" panose="02040503050406030204" pitchFamily="18" charset="0"/>
+                                  </a:rPr>
+                                </m:ctrlPr>
+                              </m:sSubPr>
+                              <m:e>
+                                <m:r>
+                                  <a:rPr lang="en-US" i="1">
+                                    <a:latin typeface="Cambria Math" panose="02040503050406030204" pitchFamily="18" charset="0"/>
+                                  </a:rPr>
+                                  <m:t>𝑓</m:t>
+                                </m:r>
+                              </m:e>
+                              <m:sub>
+                                <m:r>
+                                  <a:rPr lang="en-US" b="0" i="1" smtClean="0">
+                                    <a:latin typeface="Cambria Math" panose="02040503050406030204" pitchFamily="18" charset="0"/>
+                                  </a:rPr>
+                                  <m:t>𝑛</m:t>
+                                </m:r>
+                              </m:sub>
+                            </m:sSub>
+                            <m:r>
+                              <a:rPr lang="en-US" b="0" i="1" smtClean="0">
+                                <a:latin typeface="Cambria Math" panose="02040503050406030204" pitchFamily="18" charset="0"/>
+                              </a:rPr>
+                              <m:t>)</m:t>
+                            </m:r>
+                          </m:sup>
+                        </m:sSup>
+                        <m:r>
+                          <a:rPr lang="en-US" b="0" i="1" smtClean="0">
+                            <a:latin typeface="Cambria Math" panose="02040503050406030204" pitchFamily="18" charset="0"/>
+                          </a:rPr>
+                          <m:t>+ </m:t>
+                        </m:r>
+                        <m:sSup>
+                          <m:sSupPr>
+                            <m:ctrlPr>
+                              <a:rPr lang="en-US" b="0" i="1" smtClean="0">
+                                <a:latin typeface="Cambria Math" panose="02040503050406030204" pitchFamily="18" charset="0"/>
+                              </a:rPr>
+                            </m:ctrlPr>
+                          </m:sSupPr>
+                          <m:e>
+                            <m:r>
+                              <a:rPr lang="en-US" b="0" i="1" smtClean="0">
+                                <a:latin typeface="Cambria Math" panose="02040503050406030204" pitchFamily="18" charset="0"/>
+                              </a:rPr>
+                              <m:t>𝑒</m:t>
+                            </m:r>
+                          </m:e>
+                          <m:sup>
+                            <m:sSub>
+                              <m:sSubPr>
+                                <m:ctrlPr>
+                                  <a:rPr lang="en-US" b="0" i="1" smtClean="0">
+                                    <a:latin typeface="Cambria Math" panose="02040503050406030204" pitchFamily="18" charset="0"/>
+                                  </a:rPr>
+                                </m:ctrlPr>
+                              </m:sSubPr>
+                              <m:e>
+                                <m:r>
+                                  <a:rPr lang="en-US" b="0" i="1" smtClean="0">
+                                    <a:latin typeface="Cambria Math" panose="02040503050406030204" pitchFamily="18" charset="0"/>
+                                  </a:rPr>
+                                  <m:t>𝑓</m:t>
+                                </m:r>
+                              </m:e>
+                              <m:sub>
+                                <m:r>
+                                  <a:rPr lang="en-US" b="0" i="1" smtClean="0">
+                                    <a:latin typeface="Cambria Math" panose="02040503050406030204" pitchFamily="18" charset="0"/>
+                                  </a:rPr>
+                                  <m:t>𝑘</m:t>
+                                </m:r>
+                              </m:sub>
+                            </m:sSub>
+                          </m:sup>
+                        </m:sSup>
+                      </m:den>
+                    </m:f>
+                  </m:oMath>
+                </a14:m>
+                <a:endParaRPr lang="en-US" dirty="0"/>
+              </a:p>
+            </p:txBody>
+          </p:sp>
+        </mc:Choice>
+        <mc:Fallback>
+          <p:sp>
+            <p:nvSpPr>
+              <p:cNvPr id="3" name="Content Placeholder 2">
+                <a:extLst>
+                  <a:ext uri="{FF2B5EF4-FFF2-40B4-BE49-F238E27FC236}">
+                    <a16:creationId xmlns:a16="http://schemas.microsoft.com/office/drawing/2014/main" id="{B95FBB89-0F50-49EB-99B3-AE3DF4ED4C14}"/>
+                  </a:ext>
+                </a:extLst>
+              </p:cNvPr>
+              <p:cNvSpPr>
+                <a:spLocks noGrp="1" noRot="1" noChangeAspect="1" noMove="1" noResize="1" noEditPoints="1" noAdjustHandles="1" noChangeArrowheads="1" noChangeShapeType="1" noTextEdit="1"/>
+              </p:cNvSpPr>
+              <p:nvPr>
+                <p:ph idx="1"/>
+              </p:nvPr>
+            </p:nvSpPr>
+            <p:spPr>
+              <a:xfrm>
+                <a:off x="1120402" y="3191414"/>
+                <a:ext cx="4872134" cy="769397"/>
+              </a:xfrm>
+              <a:blipFill>
+                <a:blip r:embed="rId2"/>
+                <a:stretch>
+                  <a:fillRect/>
+                </a:stretch>
+              </a:blipFill>
+            </p:spPr>
+            <p:txBody>
+              <a:bodyPr/>
+              <a:lstStyle/>
+              <a:p>
+                <a:r>
+                  <a:rPr lang="en-US">
+                    <a:noFill/>
+                  </a:rPr>
+                  <a:t> </a:t>
+                </a:r>
+              </a:p>
+            </p:txBody>
+          </p:sp>
+        </mc:Fallback>
+      </mc:AlternateContent>
       <p:pic>
         <p:nvPicPr>
-          <p:cNvPr id="5" name="Content Placeholder 4" descr="A group of people around each other&#10;&#10;Description generated with high confidence">
+          <p:cNvPr id="5" name="Picture 4">
             <a:extLst>
               <a:ext uri="{FF2B5EF4-FFF2-40B4-BE49-F238E27FC236}">
-                <a16:creationId xmlns:a16="http://schemas.microsoft.com/office/drawing/2014/main" id="{FE5A32D8-AAEE-4AF0-BEAE-9E6803B4ABA1}"/>
+                <a16:creationId xmlns:a16="http://schemas.microsoft.com/office/drawing/2014/main" id="{FE83057E-11E9-4E6F-B760-969A305FFE07}"/>
               </a:ext>
             </a:extLst>
           </p:cNvPr>
           <p:cNvPicPr>
-            <a:picLocks noGrp="1" noChangeAspect="1"/>
+            <a:picLocks noChangeAspect="1"/>
           </p:cNvPicPr>
-          <p:nvPr>
-            <p:ph idx="1"/>
-          </p:nvPr>
+          <p:nvPr/>
         </p:nvPicPr>
         <p:blipFill>
-          <a:blip r:embed="rId2">
+          <a:blip r:embed="rId3">
             <a:extLst>
               <a:ext uri="{28A0092B-C50C-407E-A947-70E740481C1C}">
                 <a14:useLocalDpi xmlns:a14="http://schemas.microsoft.com/office/drawing/2010/main" val="0"/>
@@ -11015,368 +12295,309 @@
         </p:blipFill>
         <p:spPr>
           <a:xfrm>
-            <a:off x="7371835" y="819909"/>
-            <a:ext cx="3524763" cy="5218182"/>
-          </a:xfrm>
-        </p:spPr>
-      </p:pic>
-      <p:sp>
-        <p:nvSpPr>
-          <p:cNvPr id="7" name="Rectangle 6">
-            <a:extLst>
-              <a:ext uri="{FF2B5EF4-FFF2-40B4-BE49-F238E27FC236}">
-                <a16:creationId xmlns:a16="http://schemas.microsoft.com/office/drawing/2014/main" id="{38756425-9E29-4735-887B-50C373C9A45B}"/>
-              </a:ext>
-            </a:extLst>
-          </p:cNvPr>
-          <p:cNvSpPr/>
-          <p:nvPr/>
-        </p:nvSpPr>
-        <p:spPr>
-          <a:xfrm>
-            <a:off x="9134216" y="4161452"/>
-            <a:ext cx="183502" cy="93306"/>
+            <a:off x="6543869" y="2556932"/>
+            <a:ext cx="4572000" cy="3048000"/>
           </a:xfrm>
           <a:prstGeom prst="rect">
             <a:avLst/>
           </a:prstGeom>
         </p:spPr>
-        <p:style>
-          <a:lnRef idx="2">
-            <a:schemeClr val="accent1">
-              <a:shade val="50000"/>
-            </a:schemeClr>
-          </a:lnRef>
-          <a:fillRef idx="1">
-            <a:schemeClr val="accent1"/>
-          </a:fillRef>
-          <a:effectRef idx="0">
-            <a:schemeClr val="accent1"/>
-          </a:effectRef>
-          <a:fontRef idx="minor">
-            <a:schemeClr val="lt1"/>
-          </a:fontRef>
-        </p:style>
-        <p:txBody>
-          <a:bodyPr rtlCol="0" anchor="ctr"/>
-          <a:lstStyle/>
-          <a:p>
-            <a:pPr algn="ctr"/>
-            <a:endParaRPr lang="en-US"/>
-          </a:p>
-        </p:txBody>
-      </p:sp>
-      <p:sp>
-        <p:nvSpPr>
-          <p:cNvPr id="8" name="Content Placeholder 2">
-            <a:extLst>
-              <a:ext uri="{FF2B5EF4-FFF2-40B4-BE49-F238E27FC236}">
-                <a16:creationId xmlns:a16="http://schemas.microsoft.com/office/drawing/2014/main" id="{987845CE-0108-43B3-A0B7-CA7DA830665B}"/>
-              </a:ext>
-            </a:extLst>
-          </p:cNvPr>
-          <p:cNvSpPr txBox="1">
-            <a:spLocks/>
-          </p:cNvSpPr>
-          <p:nvPr/>
-        </p:nvSpPr>
-        <p:spPr>
-          <a:xfrm>
-            <a:off x="1295401" y="2556932"/>
-            <a:ext cx="6010468" cy="3318936"/>
-          </a:xfrm>
-          <a:prstGeom prst="rect">
-            <a:avLst/>
-          </a:prstGeom>
-        </p:spPr>
-        <p:txBody>
-          <a:bodyPr vert="horz" lIns="91440" tIns="45720" rIns="91440" bIns="45720" rtlCol="0" anchor="t">
-            <a:normAutofit/>
-          </a:bodyPr>
-          <a:lstStyle>
-            <a:lvl1pPr marL="285750" indent="-285750" algn="l" defTabSz="457200" rtl="0" eaLnBrk="1" latinLnBrk="0" hangingPunct="1">
-              <a:spcBef>
-                <a:spcPct val="20000"/>
-              </a:spcBef>
-              <a:spcAft>
-                <a:spcPts val="600"/>
-              </a:spcAft>
-              <a:buClr>
-                <a:schemeClr val="accent1"/>
-              </a:buClr>
-              <a:buSzPct val="115000"/>
-              <a:buFont typeface="Arial"/>
-              <a:buChar char="•"/>
-              <a:defRPr sz="2400" kern="1200" cap="none">
-                <a:solidFill>
-                  <a:schemeClr val="tx1">
-                    <a:lumMod val="85000"/>
-                    <a:lumOff val="15000"/>
-                  </a:schemeClr>
-                </a:solidFill>
-                <a:effectLst/>
-                <a:latin typeface="+mn-lt"/>
-                <a:ea typeface="+mn-ea"/>
-                <a:cs typeface="+mn-cs"/>
-              </a:defRPr>
-            </a:lvl1pPr>
-            <a:lvl2pPr marL="742950" indent="-285750" algn="l" defTabSz="457200" rtl="0" eaLnBrk="1" latinLnBrk="0" hangingPunct="1">
-              <a:spcBef>
-                <a:spcPct val="20000"/>
-              </a:spcBef>
-              <a:spcAft>
-                <a:spcPts val="600"/>
-              </a:spcAft>
-              <a:buClr>
-                <a:schemeClr val="accent1"/>
-              </a:buClr>
-              <a:buSzPct val="115000"/>
-              <a:buFont typeface="Arial"/>
-              <a:buChar char="•"/>
-              <a:defRPr sz="2000" kern="1200" cap="none">
-                <a:solidFill>
-                  <a:schemeClr val="tx1">
-                    <a:lumMod val="85000"/>
-                    <a:lumOff val="15000"/>
-                  </a:schemeClr>
-                </a:solidFill>
-                <a:effectLst/>
-                <a:latin typeface="+mn-lt"/>
-                <a:ea typeface="+mn-ea"/>
-                <a:cs typeface="+mn-cs"/>
-              </a:defRPr>
-            </a:lvl2pPr>
-            <a:lvl3pPr marL="1200150" indent="-285750" algn="l" defTabSz="457200" rtl="0" eaLnBrk="1" latinLnBrk="0" hangingPunct="1">
-              <a:spcBef>
-                <a:spcPct val="20000"/>
-              </a:spcBef>
-              <a:spcAft>
-                <a:spcPts val="600"/>
-              </a:spcAft>
-              <a:buClr>
-                <a:schemeClr val="accent1"/>
-              </a:buClr>
-              <a:buSzPct val="115000"/>
-              <a:buFont typeface="Arial"/>
-              <a:buChar char="•"/>
-              <a:defRPr sz="1800" kern="1200" cap="none">
-                <a:solidFill>
-                  <a:schemeClr val="tx1">
-                    <a:lumMod val="85000"/>
-                    <a:lumOff val="15000"/>
-                  </a:schemeClr>
-                </a:solidFill>
-                <a:effectLst/>
-                <a:latin typeface="+mn-lt"/>
-                <a:ea typeface="+mn-ea"/>
-                <a:cs typeface="+mn-cs"/>
-              </a:defRPr>
-            </a:lvl3pPr>
-            <a:lvl4pPr marL="1543050" indent="-171450" algn="l" defTabSz="457200" rtl="0" eaLnBrk="1" latinLnBrk="0" hangingPunct="1">
-              <a:spcBef>
-                <a:spcPct val="20000"/>
-              </a:spcBef>
-              <a:spcAft>
-                <a:spcPts val="600"/>
-              </a:spcAft>
-              <a:buClr>
-                <a:schemeClr val="accent1"/>
-              </a:buClr>
-              <a:buSzPct val="115000"/>
-              <a:buFont typeface="Arial"/>
-              <a:buChar char="•"/>
-              <a:defRPr sz="1600" kern="1200" cap="none">
-                <a:solidFill>
-                  <a:schemeClr val="tx1">
-                    <a:lumMod val="85000"/>
-                    <a:lumOff val="15000"/>
-                  </a:schemeClr>
-                </a:solidFill>
-                <a:effectLst/>
-                <a:latin typeface="+mn-lt"/>
-                <a:ea typeface="+mn-ea"/>
-                <a:cs typeface="+mn-cs"/>
-              </a:defRPr>
-            </a:lvl4pPr>
-            <a:lvl5pPr marL="2000250" indent="-171450" algn="l" defTabSz="457200" rtl="0" eaLnBrk="1" latinLnBrk="0" hangingPunct="1">
-              <a:spcBef>
-                <a:spcPct val="20000"/>
-              </a:spcBef>
-              <a:spcAft>
-                <a:spcPts val="600"/>
-              </a:spcAft>
-              <a:buClr>
-                <a:schemeClr val="accent1"/>
-              </a:buClr>
-              <a:buSzPct val="115000"/>
-              <a:buFont typeface="Arial"/>
-              <a:buChar char="•"/>
-              <a:defRPr sz="1400" kern="1200" cap="none">
-                <a:solidFill>
-                  <a:schemeClr val="tx1">
-                    <a:lumMod val="85000"/>
-                    <a:lumOff val="15000"/>
-                  </a:schemeClr>
-                </a:solidFill>
-                <a:effectLst/>
-                <a:latin typeface="+mn-lt"/>
-                <a:ea typeface="+mn-ea"/>
-                <a:cs typeface="+mn-cs"/>
-              </a:defRPr>
-            </a:lvl5pPr>
-            <a:lvl6pPr marL="2514600" indent="-228600" algn="l" defTabSz="457200" rtl="0" eaLnBrk="1" latinLnBrk="0" hangingPunct="1">
-              <a:spcBef>
-                <a:spcPct val="20000"/>
-              </a:spcBef>
-              <a:spcAft>
-                <a:spcPts val="600"/>
-              </a:spcAft>
-              <a:buClr>
-                <a:schemeClr val="accent1"/>
-              </a:buClr>
-              <a:buSzPct val="115000"/>
-              <a:buFont typeface="Arial"/>
-              <a:buChar char="•"/>
-              <a:defRPr sz="1400" kern="1200" cap="none">
-                <a:solidFill>
-                  <a:schemeClr val="tx1">
-                    <a:lumMod val="85000"/>
-                    <a:lumOff val="15000"/>
-                  </a:schemeClr>
-                </a:solidFill>
-                <a:effectLst/>
-                <a:latin typeface="+mn-lt"/>
-                <a:ea typeface="+mn-ea"/>
-                <a:cs typeface="+mn-cs"/>
-              </a:defRPr>
-            </a:lvl6pPr>
-            <a:lvl7pPr marL="2971800" indent="-228600" algn="l" defTabSz="457200" rtl="0" eaLnBrk="1" latinLnBrk="0" hangingPunct="1">
-              <a:spcBef>
-                <a:spcPct val="20000"/>
-              </a:spcBef>
-              <a:spcAft>
-                <a:spcPts val="600"/>
-              </a:spcAft>
-              <a:buClr>
-                <a:schemeClr val="accent1"/>
-              </a:buClr>
-              <a:buSzPct val="115000"/>
-              <a:buFont typeface="Arial"/>
-              <a:buChar char="•"/>
-              <a:defRPr sz="1400" kern="1200" cap="none">
-                <a:solidFill>
-                  <a:schemeClr val="tx1">
-                    <a:lumMod val="85000"/>
-                    <a:lumOff val="15000"/>
-                  </a:schemeClr>
-                </a:solidFill>
-                <a:effectLst/>
-                <a:latin typeface="+mn-lt"/>
-                <a:ea typeface="+mn-ea"/>
-                <a:cs typeface="+mn-cs"/>
-              </a:defRPr>
-            </a:lvl7pPr>
-            <a:lvl8pPr marL="3429000" indent="-228600" algn="l" defTabSz="457200" rtl="0" eaLnBrk="1" latinLnBrk="0" hangingPunct="1">
-              <a:spcBef>
-                <a:spcPct val="20000"/>
-              </a:spcBef>
-              <a:spcAft>
-                <a:spcPts val="600"/>
-              </a:spcAft>
-              <a:buClr>
-                <a:schemeClr val="accent1"/>
-              </a:buClr>
-              <a:buSzPct val="115000"/>
-              <a:buFont typeface="Arial"/>
-              <a:buChar char="•"/>
-              <a:defRPr sz="1400" kern="1200" cap="none">
-                <a:solidFill>
-                  <a:schemeClr val="tx1">
-                    <a:lumMod val="85000"/>
-                    <a:lumOff val="15000"/>
-                  </a:schemeClr>
-                </a:solidFill>
-                <a:effectLst/>
-                <a:latin typeface="+mn-lt"/>
-                <a:ea typeface="+mn-ea"/>
-                <a:cs typeface="+mn-cs"/>
-              </a:defRPr>
-            </a:lvl8pPr>
-            <a:lvl9pPr marL="3886200" indent="-228600" algn="l" defTabSz="457200" rtl="0" eaLnBrk="1" latinLnBrk="0" hangingPunct="1">
-              <a:spcBef>
-                <a:spcPct val="20000"/>
-              </a:spcBef>
-              <a:spcAft>
-                <a:spcPts val="600"/>
-              </a:spcAft>
-              <a:buClr>
-                <a:schemeClr val="accent1"/>
-              </a:buClr>
-              <a:buSzPct val="115000"/>
-              <a:buFont typeface="Arial"/>
-              <a:buChar char="•"/>
-              <a:defRPr sz="1400" kern="1200" cap="none">
-                <a:solidFill>
-                  <a:schemeClr val="tx1">
-                    <a:lumMod val="85000"/>
-                    <a:lumOff val="15000"/>
-                  </a:schemeClr>
-                </a:solidFill>
-                <a:effectLst/>
-                <a:latin typeface="+mn-lt"/>
-                <a:ea typeface="+mn-ea"/>
-                <a:cs typeface="+mn-cs"/>
-              </a:defRPr>
-            </a:lvl9pPr>
-          </a:lstStyle>
-          <a:p>
-            <a:pPr marL="0" indent="0">
-              <a:buFont typeface="Arial"/>
-              <a:buNone/>
-            </a:pPr>
-            <a:endParaRPr lang="en-US" dirty="0"/>
-          </a:p>
-        </p:txBody>
-      </p:sp>
-      <p:sp>
-        <p:nvSpPr>
-          <p:cNvPr id="9" name="TextBox 8">
-            <a:extLst>
-              <a:ext uri="{FF2B5EF4-FFF2-40B4-BE49-F238E27FC236}">
-                <a16:creationId xmlns:a16="http://schemas.microsoft.com/office/drawing/2014/main" id="{1522464D-9405-4CEE-B657-73AA879EE61C}"/>
-              </a:ext>
-            </a:extLst>
-          </p:cNvPr>
-          <p:cNvSpPr txBox="1"/>
-          <p:nvPr/>
-        </p:nvSpPr>
-        <p:spPr>
-          <a:xfrm>
-            <a:off x="1295401" y="2448222"/>
-            <a:ext cx="4488676" cy="1200329"/>
-          </a:xfrm>
-          <a:prstGeom prst="rect">
-            <a:avLst/>
-          </a:prstGeom>
-          <a:noFill/>
-        </p:spPr>
-        <p:txBody>
-          <a:bodyPr wrap="square" rtlCol="0">
-            <a:spAutoFit/>
-          </a:bodyPr>
-          <a:lstStyle/>
-          <a:p>
-            <a:r>
-              <a:rPr lang="en-US" dirty="0"/>
-              <a:t>“Young audiences were more likely to use WhatsApp, Instagram and Snapchat for news, partly because there was a growing desire to discuss news in relative privacy”</a:t>
-            </a:r>
-          </a:p>
-        </p:txBody>
-      </p:sp>
+      </p:pic>
+      <mc:AlternateContent xmlns:mc="http://schemas.openxmlformats.org/markup-compatibility/2006">
+        <mc:Choice xmlns:a14="http://schemas.microsoft.com/office/drawing/2010/main" Requires="a14">
+          <p:sp>
+            <p:nvSpPr>
+              <p:cNvPr id="6" name="TextBox 5">
+                <a:extLst>
+                  <a:ext uri="{FF2B5EF4-FFF2-40B4-BE49-F238E27FC236}">
+                    <a16:creationId xmlns:a16="http://schemas.microsoft.com/office/drawing/2014/main" id="{BC5C03DF-57EF-49ED-8800-7AAD39D751A1}"/>
+                  </a:ext>
+                </a:extLst>
+              </p:cNvPr>
+              <p:cNvSpPr txBox="1"/>
+              <p:nvPr/>
+            </p:nvSpPr>
+            <p:spPr>
+              <a:xfrm>
+                <a:off x="7536268" y="5666224"/>
+                <a:ext cx="2221506" cy="419282"/>
+              </a:xfrm>
+              <a:prstGeom prst="rect">
+                <a:avLst/>
+              </a:prstGeom>
+              <a:noFill/>
+            </p:spPr>
+            <p:txBody>
+              <a:bodyPr wrap="none" lIns="0" tIns="0" rIns="0" bIns="0" rtlCol="0">
+                <a:spAutoFit/>
+              </a:bodyPr>
+              <a:lstStyle/>
+              <a:p>
+                <a:r>
+                  <a:rPr lang="en-US" i="1" dirty="0"/>
+                  <a:t>Sigmoid function: Y</a:t>
+                </a:r>
+                <a:r>
+                  <a:rPr lang="en-US" dirty="0"/>
+                  <a:t> = </a:t>
+                </a:r>
+                <a14:m>
+                  <m:oMath xmlns:m="http://schemas.openxmlformats.org/officeDocument/2006/math">
+                    <m:f>
+                      <m:fPr>
+                        <m:ctrlPr>
+                          <a:rPr lang="en-US" i="1" smtClean="0">
+                            <a:latin typeface="Cambria Math" panose="02040503050406030204" pitchFamily="18" charset="0"/>
+                          </a:rPr>
+                        </m:ctrlPr>
+                      </m:fPr>
+                      <m:num>
+                        <m:sSup>
+                          <m:sSupPr>
+                            <m:ctrlPr>
+                              <a:rPr lang="en-US" i="1" smtClean="0">
+                                <a:latin typeface="Cambria Math" panose="02040503050406030204" pitchFamily="18" charset="0"/>
+                              </a:rPr>
+                            </m:ctrlPr>
+                          </m:sSupPr>
+                          <m:e>
+                            <m:r>
+                              <a:rPr lang="en-US" b="0" i="1" smtClean="0">
+                                <a:latin typeface="Cambria Math" panose="02040503050406030204" pitchFamily="18" charset="0"/>
+                              </a:rPr>
+                              <m:t>𝑒</m:t>
+                            </m:r>
+                          </m:e>
+                          <m:sup>
+                            <m:r>
+                              <a:rPr lang="en-US" b="0" i="1" smtClean="0">
+                                <a:latin typeface="Cambria Math" panose="02040503050406030204" pitchFamily="18" charset="0"/>
+                              </a:rPr>
+                              <m:t>𝑥</m:t>
+                            </m:r>
+                          </m:sup>
+                        </m:sSup>
+                      </m:num>
+                      <m:den>
+                        <m:sSup>
+                          <m:sSupPr>
+                            <m:ctrlPr>
+                              <a:rPr lang="en-US" i="1" smtClean="0">
+                                <a:latin typeface="Cambria Math" panose="02040503050406030204" pitchFamily="18" charset="0"/>
+                              </a:rPr>
+                            </m:ctrlPr>
+                          </m:sSupPr>
+                          <m:e>
+                            <m:r>
+                              <a:rPr lang="en-US" b="0" i="1" smtClean="0">
+                                <a:latin typeface="Cambria Math" panose="02040503050406030204" pitchFamily="18" charset="0"/>
+                              </a:rPr>
+                              <m:t>1+</m:t>
+                            </m:r>
+                            <m:r>
+                              <a:rPr lang="en-US" b="0" i="1" smtClean="0">
+                                <a:latin typeface="Cambria Math" panose="02040503050406030204" pitchFamily="18" charset="0"/>
+                              </a:rPr>
+                              <m:t>𝑒</m:t>
+                            </m:r>
+                          </m:e>
+                          <m:sup>
+                            <m:r>
+                              <a:rPr lang="en-US" b="0" i="1" smtClean="0">
+                                <a:latin typeface="Cambria Math" panose="02040503050406030204" pitchFamily="18" charset="0"/>
+                              </a:rPr>
+                              <m:t>𝑥</m:t>
+                            </m:r>
+                          </m:sup>
+                        </m:sSup>
+                      </m:den>
+                    </m:f>
+                  </m:oMath>
+                </a14:m>
+                <a:endParaRPr lang="en-US" dirty="0"/>
+              </a:p>
+            </p:txBody>
+          </p:sp>
+        </mc:Choice>
+        <mc:Fallback>
+          <p:sp>
+            <p:nvSpPr>
+              <p:cNvPr id="6" name="TextBox 5">
+                <a:extLst>
+                  <a:ext uri="{FF2B5EF4-FFF2-40B4-BE49-F238E27FC236}">
+                    <a16:creationId xmlns:a16="http://schemas.microsoft.com/office/drawing/2014/main" id="{BC5C03DF-57EF-49ED-8800-7AAD39D751A1}"/>
+                  </a:ext>
+                </a:extLst>
+              </p:cNvPr>
+              <p:cNvSpPr txBox="1">
+                <a:spLocks noRot="1" noChangeAspect="1" noMove="1" noResize="1" noEditPoints="1" noAdjustHandles="1" noChangeArrowheads="1" noChangeShapeType="1" noTextEdit="1"/>
+              </p:cNvSpPr>
+              <p:nvPr/>
+            </p:nvSpPr>
+            <p:spPr>
+              <a:xfrm>
+                <a:off x="7536268" y="5666224"/>
+                <a:ext cx="2221506" cy="419282"/>
+              </a:xfrm>
+              <a:prstGeom prst="rect">
+                <a:avLst/>
+              </a:prstGeom>
+              <a:blipFill>
+                <a:blip r:embed="rId4"/>
+                <a:stretch>
+                  <a:fillRect l="-6301" r="-822" b="-21739"/>
+                </a:stretch>
+              </a:blipFill>
+            </p:spPr>
+            <p:txBody>
+              <a:bodyPr/>
+              <a:lstStyle/>
+              <a:p>
+                <a:r>
+                  <a:rPr lang="en-US">
+                    <a:noFill/>
+                  </a:rPr>
+                  <a:t> </a:t>
+                </a:r>
+              </a:p>
+            </p:txBody>
+          </p:sp>
+        </mc:Fallback>
+      </mc:AlternateContent>
+      <mc:AlternateContent xmlns:mc="http://schemas.openxmlformats.org/markup-compatibility/2006">
+        <mc:Choice xmlns:a14="http://schemas.microsoft.com/office/drawing/2010/main" Requires="a14">
+          <p:sp>
+            <p:nvSpPr>
+              <p:cNvPr id="7" name="TextBox 6">
+                <a:extLst>
+                  <a:ext uri="{FF2B5EF4-FFF2-40B4-BE49-F238E27FC236}">
+                    <a16:creationId xmlns:a16="http://schemas.microsoft.com/office/drawing/2014/main" id="{6022649D-D5BC-470F-879B-9A5BC84A979B}"/>
+                  </a:ext>
+                </a:extLst>
+              </p:cNvPr>
+              <p:cNvSpPr txBox="1"/>
+              <p:nvPr/>
+            </p:nvSpPr>
+            <p:spPr>
+              <a:xfrm>
+                <a:off x="1120402" y="2556932"/>
+                <a:ext cx="5202643" cy="558936"/>
+              </a:xfrm>
+              <a:prstGeom prst="rect">
+                <a:avLst/>
+              </a:prstGeom>
+              <a:noFill/>
+            </p:spPr>
+            <p:txBody>
+              <a:bodyPr wrap="none" lIns="0" tIns="0" rIns="0" bIns="0" rtlCol="0">
+                <a:spAutoFit/>
+              </a:bodyPr>
+              <a:lstStyle/>
+              <a:p>
+                <a14:m>
+                  <m:oMath xmlns:m="http://schemas.openxmlformats.org/officeDocument/2006/math">
+                    <m:r>
+                      <a:rPr lang="en-US" b="0" i="1" smtClean="0">
+                        <a:latin typeface="Cambria Math" panose="02040503050406030204" pitchFamily="18" charset="0"/>
+                      </a:rPr>
+                      <m:t>𝐿𝑒𝑡</m:t>
+                    </m:r>
+                    <m:r>
+                      <a:rPr lang="en-US" b="0" i="1" smtClean="0">
+                        <a:latin typeface="Cambria Math" panose="02040503050406030204" pitchFamily="18" charset="0"/>
+                      </a:rPr>
+                      <m:t> </m:t>
+                    </m:r>
+                    <m:sSup>
+                      <m:sSupPr>
+                        <m:ctrlPr>
+                          <a:rPr lang="en-US" i="1" smtClean="0">
+                            <a:latin typeface="Cambria Math" panose="02040503050406030204" pitchFamily="18" charset="0"/>
+                          </a:rPr>
+                        </m:ctrlPr>
+                      </m:sSupPr>
+                      <m:e>
+                        <m:r>
+                          <a:rPr lang="en-US" b="0" i="1" smtClean="0">
+                            <a:latin typeface="Cambria Math" panose="02040503050406030204" pitchFamily="18" charset="0"/>
+                          </a:rPr>
+                          <m:t>𝑓</m:t>
+                        </m:r>
+                      </m:e>
+                      <m:sup>
+                        <m:r>
+                          <a:rPr lang="en-US" b="0" i="1" smtClean="0">
+                            <a:latin typeface="Cambria Math" panose="02040503050406030204" pitchFamily="18" charset="0"/>
+                          </a:rPr>
+                          <m:t>𝑘</m:t>
+                        </m:r>
+                      </m:sup>
+                    </m:sSup>
+                  </m:oMath>
+                </a14:m>
+                <a:r>
+                  <a:rPr lang="en-US" dirty="0"/>
+                  <a:t> be the frequency of the word in a document along</a:t>
+                </a:r>
+              </a:p>
+              <a:p>
+                <a:r>
+                  <a:rPr lang="en-US" dirty="0"/>
+                  <a:t>edge k</a:t>
+                </a:r>
+              </a:p>
+            </p:txBody>
+          </p:sp>
+        </mc:Choice>
+        <mc:Fallback>
+          <p:sp>
+            <p:nvSpPr>
+              <p:cNvPr id="7" name="TextBox 6">
+                <a:extLst>
+                  <a:ext uri="{FF2B5EF4-FFF2-40B4-BE49-F238E27FC236}">
+                    <a16:creationId xmlns:a16="http://schemas.microsoft.com/office/drawing/2014/main" id="{6022649D-D5BC-470F-879B-9A5BC84A979B}"/>
+                  </a:ext>
+                </a:extLst>
+              </p:cNvPr>
+              <p:cNvSpPr txBox="1">
+                <a:spLocks noRot="1" noChangeAspect="1" noMove="1" noResize="1" noEditPoints="1" noAdjustHandles="1" noChangeArrowheads="1" noChangeShapeType="1" noTextEdit="1"/>
+              </p:cNvSpPr>
+              <p:nvPr/>
+            </p:nvSpPr>
+            <p:spPr>
+              <a:xfrm>
+                <a:off x="1120402" y="2556932"/>
+                <a:ext cx="5202643" cy="558936"/>
+              </a:xfrm>
+              <a:prstGeom prst="rect">
+                <a:avLst/>
+              </a:prstGeom>
+              <a:blipFill>
+                <a:blip r:embed="rId5"/>
+                <a:stretch>
+                  <a:fillRect l="-2814" t="-11957" r="-1876" b="-25000"/>
+                </a:stretch>
+              </a:blipFill>
+            </p:spPr>
+            <p:txBody>
+              <a:bodyPr/>
+              <a:lstStyle/>
+              <a:p>
+                <a:r>
+                  <a:rPr lang="en-US">
+                    <a:noFill/>
+                  </a:rPr>
+                  <a:t> </a:t>
+                </a:r>
+              </a:p>
+            </p:txBody>
+          </p:sp>
+        </mc:Fallback>
+      </mc:AlternateContent>
     </p:spTree>
     <p:extLst>
       <p:ext uri="{BB962C8B-B14F-4D97-AF65-F5344CB8AC3E}">
-        <p14:creationId xmlns:p14="http://schemas.microsoft.com/office/powerpoint/2010/main" val="3769623573"/>
+        <p14:creationId xmlns:p14="http://schemas.microsoft.com/office/powerpoint/2010/main" val="411337518"/>
       </p:ext>
     </p:extLst>
   </p:cSld>
@@ -11408,7 +12629,7 @@
           <p:cNvPr id="2" name="Title 1">
             <a:extLst>
               <a:ext uri="{FF2B5EF4-FFF2-40B4-BE49-F238E27FC236}">
-                <a16:creationId xmlns:a16="http://schemas.microsoft.com/office/drawing/2014/main" id="{BD553D38-4F07-4D16-BE38-1418F465FCE5}"/>
+                <a16:creationId xmlns:a16="http://schemas.microsoft.com/office/drawing/2014/main" id="{0254221D-0171-47F8-B537-A6D1F39B1FEE}"/>
               </a:ext>
             </a:extLst>
           </p:cNvPr>
@@ -11424,7 +12645,10 @@
           <a:bodyPr/>
           <a:lstStyle/>
           <a:p>
-            <a:endParaRPr lang="en-US"/>
+            <a:r>
+              <a:rPr lang="en-US" dirty="0"/>
+              <a:t>Chatbot</a:t>
+            </a:r>
           </a:p>
         </p:txBody>
       </p:sp>
@@ -11433,7 +12657,7 @@
           <p:cNvPr id="3" name="Content Placeholder 2">
             <a:extLst>
               <a:ext uri="{FF2B5EF4-FFF2-40B4-BE49-F238E27FC236}">
-                <a16:creationId xmlns:a16="http://schemas.microsoft.com/office/drawing/2014/main" id="{9C1C78E6-F716-498E-A20E-488DB36BA08A}"/>
+                <a16:creationId xmlns:a16="http://schemas.microsoft.com/office/drawing/2014/main" id="{48253A9A-54A6-4850-8D9B-474357AA7A4C}"/>
               </a:ext>
             </a:extLst>
           </p:cNvPr>
@@ -11449,14 +12673,63 @@
           <a:bodyPr/>
           <a:lstStyle/>
           <a:p>
-            <a:endParaRPr lang="en-US"/>
+            <a:r>
+              <a:rPr lang="en-US" dirty="0"/>
+              <a:t>Telegram bot:</a:t>
+            </a:r>
+          </a:p>
+          <a:p>
+            <a:pPr lvl="1"/>
+            <a:r>
+              <a:rPr lang="en-US" dirty="0"/>
+              <a:t>Responds to common queries (greetings)</a:t>
+            </a:r>
+          </a:p>
+          <a:p>
+            <a:pPr lvl="1"/>
+            <a:r>
+              <a:rPr lang="en-US" dirty="0"/>
+              <a:t>Answers tagged queries (“@</a:t>
+            </a:r>
+            <a:r>
+              <a:rPr lang="en-US" dirty="0" err="1"/>
+              <a:t>SaucePlzBot</a:t>
+            </a:r>
+            <a:r>
+              <a:rPr lang="en-US" dirty="0"/>
+              <a:t> Where float </a:t>
+            </a:r>
+            <a:r>
+              <a:rPr lang="en-US" dirty="0" err="1"/>
+              <a:t>si</a:t>
+            </a:r>
+            <a:r>
+              <a:rPr lang="en-US" dirty="0"/>
+              <a:t> </a:t>
+            </a:r>
+            <a:r>
+              <a:rPr lang="en-US" dirty="0" err="1"/>
+              <a:t>beh</a:t>
+            </a:r>
+            <a:r>
+              <a:rPr lang="en-US" dirty="0"/>
+              <a:t> </a:t>
+            </a:r>
+            <a:r>
+              <a:rPr lang="en-US" dirty="0" err="1"/>
+              <a:t>siao</a:t>
+            </a:r>
+            <a:r>
+              <a:rPr lang="en-US" dirty="0"/>
+              <a:t> Trump balloon”) and provides link to reference</a:t>
+            </a:r>
           </a:p>
         </p:txBody>
       </p:sp>
     </p:spTree>
     <p:extLst>
       <p:ext uri="{BB962C8B-B14F-4D97-AF65-F5344CB8AC3E}">
-        <p14:creationId xmlns:p14="http://schemas.microsoft.com/office/powerpoint/2010/main" val="32652585"/>
+        <p14:creationId xmlns:p14="http://schemas.microsoft.com/office/powerpoint/2010/main" val="3560086853"/>
       </p:ext>
     </p:extLst>
   </p:cSld>

</xml_diff>